<commit_message>
Work on the fiducial calibration protocol
</commit_message>
<xml_diff>
--- a/scCalibration/Images.pptx
+++ b/scCalibration/Images.pptx
@@ -5,11 +5,19 @@
     <p:sldMasterId id="2147483648" r:id="rId3"/>
   </p:sldMasterIdLst>
   <p:notesMasterIdLst>
-    <p:notesMasterId r:id="rId6"/>
+    <p:notesMasterId r:id="rId14"/>
   </p:notesMasterIdLst>
   <p:sldIdLst>
-    <p:sldId id="256" r:id="rId4"/>
-    <p:sldId id="257" r:id="rId5"/>
+    <p:sldId id="265" r:id="rId4"/>
+    <p:sldId id="264" r:id="rId5"/>
+    <p:sldId id="263" r:id="rId6"/>
+    <p:sldId id="266" r:id="rId7"/>
+    <p:sldId id="256" r:id="rId8"/>
+    <p:sldId id="257" r:id="rId9"/>
+    <p:sldId id="258" r:id="rId10"/>
+    <p:sldId id="259" r:id="rId11"/>
+    <p:sldId id="260" r:id="rId12"/>
+    <p:sldId id="261" r:id="rId13"/>
   </p:sldIdLst>
   <p:sldSz cx="12192000" cy="6858000"/>
   <p:notesSz cx="6858000" cy="9144000"/>
@@ -352,7 +360,7 @@
           <a:p>
             <a:fld id="{E7512D7E-BE5A-4217-B140-32655DCFE25E}" type="datetimeFigureOut">
               <a:rPr lang="en-DK" smtClean="0"/>
-              <a:t>16/09/2024</a:t>
+              <a:t>11/11/2024</a:t>
             </a:fld>
             <a:endParaRPr lang="en-DK"/>
           </a:p>
@@ -625,7 +633,13 @@
   <p:cSld>
     <p:spTree>
       <p:nvGrpSpPr>
-        <p:cNvPr id="1" name=""/>
+        <p:cNvPr id="1" name="">
+          <a:extLst>
+            <a:ext uri="{FF2B5EF4-FFF2-40B4-BE49-F238E27FC236}">
+              <a16:creationId xmlns:a16="http://schemas.microsoft.com/office/drawing/2014/main" id="{D2DAA4C3-313E-FA88-8389-EE2E3D7FEED9}"/>
+            </a:ext>
+          </a:extLst>
+        </p:cNvPr>
         <p:cNvGrpSpPr/>
         <p:nvPr/>
       </p:nvGrpSpPr>
@@ -639,7 +653,13 @@
       </p:grpSpPr>
       <p:sp>
         <p:nvSpPr>
-          <p:cNvPr id="2" name="Slide Image Placeholder 1"/>
+          <p:cNvPr id="2" name="Slide Image Placeholder 1">
+            <a:extLst>
+              <a:ext uri="{FF2B5EF4-FFF2-40B4-BE49-F238E27FC236}">
+                <a16:creationId xmlns:a16="http://schemas.microsoft.com/office/drawing/2014/main" id="{66F8231A-9A3E-4019-B2AE-FF50663B94B5}"/>
+              </a:ext>
+            </a:extLst>
+          </p:cNvPr>
           <p:cNvSpPr>
             <a:spLocks noGrp="1" noRot="1" noChangeAspect="1"/>
           </p:cNvSpPr>
@@ -651,7 +671,13 @@
       </p:sp>
       <p:sp>
         <p:nvSpPr>
-          <p:cNvPr id="3" name="Notes Placeholder 2"/>
+          <p:cNvPr id="3" name="Notes Placeholder 2">
+            <a:extLst>
+              <a:ext uri="{FF2B5EF4-FFF2-40B4-BE49-F238E27FC236}">
+                <a16:creationId xmlns:a16="http://schemas.microsoft.com/office/drawing/2014/main" id="{6302A6AB-4404-CD3D-3E5E-221600ADD192}"/>
+              </a:ext>
+            </a:extLst>
+          </p:cNvPr>
           <p:cNvSpPr>
             <a:spLocks noGrp="1"/>
           </p:cNvSpPr>
@@ -664,13 +690,52 @@
           <a:bodyPr/>
           <a:lstStyle/>
           <a:p>
-            <a:endParaRPr lang="en-DK" dirty="0"/>
+            <a:pPr marL="0" marR="0" lvl="0" indent="0" algn="l" defTabSz="914400" rtl="0" eaLnBrk="1" fontAlgn="auto" latinLnBrk="0" hangingPunct="1">
+              <a:lnSpc>
+                <a:spcPct val="100000"/>
+              </a:lnSpc>
+              <a:spcBef>
+                <a:spcPts val="0"/>
+              </a:spcBef>
+              <a:spcAft>
+                <a:spcPts val="0"/>
+              </a:spcAft>
+              <a:buClrTx/>
+              <a:buSzTx/>
+              <a:buFontTx/>
+              <a:buNone/>
+              <a:tabLst/>
+              <a:defRPr/>
+            </a:pPr>
+            <a:r>
+              <a:rPr lang="en-GB" b="0" dirty="0">
+                <a:solidFill>
+                  <a:srgbClr val="CE9178"/>
+                </a:solidFill>
+                <a:effectLst/>
+                <a:latin typeface="Fira Code" pitchFamily="1" charset="0"/>
+              </a:rPr>
+              <a:t>ScreenSizeMeasurement.png</a:t>
+            </a:r>
+            <a:endParaRPr lang="en-GB" b="0" dirty="0">
+              <a:solidFill>
+                <a:srgbClr val="D4D4D4"/>
+              </a:solidFill>
+              <a:effectLst/>
+              <a:latin typeface="Fira Code" pitchFamily="1" charset="0"/>
+            </a:endParaRPr>
           </a:p>
         </p:txBody>
       </p:sp>
       <p:sp>
         <p:nvSpPr>
-          <p:cNvPr id="4" name="Slide Number Placeholder 3"/>
+          <p:cNvPr id="4" name="Slide Number Placeholder 3">
+            <a:extLst>
+              <a:ext uri="{FF2B5EF4-FFF2-40B4-BE49-F238E27FC236}">
+                <a16:creationId xmlns:a16="http://schemas.microsoft.com/office/drawing/2014/main" id="{C117FA51-9371-291D-523D-19A17BCCF773}"/>
+              </a:ext>
+            </a:extLst>
+          </p:cNvPr>
           <p:cNvSpPr>
             <a:spLocks noGrp="1"/>
           </p:cNvSpPr>
@@ -694,7 +759,119 @@
     </p:spTree>
     <p:extLst>
       <p:ext uri="{BB962C8B-B14F-4D97-AF65-F5344CB8AC3E}">
-        <p14:creationId xmlns:p14="http://schemas.microsoft.com/office/powerpoint/2010/main" val="3317900046"/>
+        <p14:creationId xmlns:p14="http://schemas.microsoft.com/office/powerpoint/2010/main" val="2342311720"/>
+      </p:ext>
+    </p:extLst>
+  </p:cSld>
+  <p:clrMapOvr>
+    <a:masterClrMapping/>
+  </p:clrMapOvr>
+</p:notes>
+</file>
+
+<file path=ppt/notesSlides/notesSlide10.xml><?xml version="1.0" encoding="utf-8"?>
+<p:notes xmlns:a="http://schemas.openxmlformats.org/drawingml/2006/main" xmlns:r="http://schemas.openxmlformats.org/officeDocument/2006/relationships" xmlns:p="http://schemas.openxmlformats.org/presentationml/2006/main">
+  <p:cSld>
+    <p:spTree>
+      <p:nvGrpSpPr>
+        <p:cNvPr id="1" name="">
+          <a:extLst>
+            <a:ext uri="{FF2B5EF4-FFF2-40B4-BE49-F238E27FC236}">
+              <a16:creationId xmlns:a16="http://schemas.microsoft.com/office/drawing/2014/main" id="{4ED7D559-D08F-8965-2F56-E339551A3565}"/>
+            </a:ext>
+          </a:extLst>
+        </p:cNvPr>
+        <p:cNvGrpSpPr/>
+        <p:nvPr/>
+      </p:nvGrpSpPr>
+      <p:grpSpPr>
+        <a:xfrm>
+          <a:off x="0" y="0"/>
+          <a:ext cx="0" cy="0"/>
+          <a:chOff x="0" y="0"/>
+          <a:chExt cx="0" cy="0"/>
+        </a:xfrm>
+      </p:grpSpPr>
+      <p:sp>
+        <p:nvSpPr>
+          <p:cNvPr id="2" name="Slide Image Placeholder 1">
+            <a:extLst>
+              <a:ext uri="{FF2B5EF4-FFF2-40B4-BE49-F238E27FC236}">
+                <a16:creationId xmlns:a16="http://schemas.microsoft.com/office/drawing/2014/main" id="{DB1C6FE8-264C-5042-E311-D7D6C532579F}"/>
+              </a:ext>
+            </a:extLst>
+          </p:cNvPr>
+          <p:cNvSpPr>
+            <a:spLocks noGrp="1" noRot="1" noChangeAspect="1"/>
+          </p:cNvSpPr>
+          <p:nvPr>
+            <p:ph type="sldImg"/>
+          </p:nvPr>
+        </p:nvSpPr>
+        <p:spPr/>
+      </p:sp>
+      <p:sp>
+        <p:nvSpPr>
+          <p:cNvPr id="3" name="Notes Placeholder 2">
+            <a:extLst>
+              <a:ext uri="{FF2B5EF4-FFF2-40B4-BE49-F238E27FC236}">
+                <a16:creationId xmlns:a16="http://schemas.microsoft.com/office/drawing/2014/main" id="{D0A5A66B-F673-5096-3F26-3E7B91698D57}"/>
+              </a:ext>
+            </a:extLst>
+          </p:cNvPr>
+          <p:cNvSpPr>
+            <a:spLocks noGrp="1"/>
+          </p:cNvSpPr>
+          <p:nvPr>
+            <p:ph type="body" idx="1"/>
+          </p:nvPr>
+        </p:nvSpPr>
+        <p:spPr/>
+        <p:txBody>
+          <a:bodyPr/>
+          <a:lstStyle/>
+          <a:p>
+            <a:r>
+              <a:rPr lang="en-GB" dirty="0"/>
+              <a:t>S4.png</a:t>
+            </a:r>
+            <a:endParaRPr lang="en-DK" dirty="0"/>
+          </a:p>
+        </p:txBody>
+      </p:sp>
+      <p:sp>
+        <p:nvSpPr>
+          <p:cNvPr id="4" name="Slide Number Placeholder 3">
+            <a:extLst>
+              <a:ext uri="{FF2B5EF4-FFF2-40B4-BE49-F238E27FC236}">
+                <a16:creationId xmlns:a16="http://schemas.microsoft.com/office/drawing/2014/main" id="{F1DBAF1C-DD02-9311-89F1-716AC547E33D}"/>
+              </a:ext>
+            </a:extLst>
+          </p:cNvPr>
+          <p:cNvSpPr>
+            <a:spLocks noGrp="1"/>
+          </p:cNvSpPr>
+          <p:nvPr>
+            <p:ph type="sldNum" sz="quarter" idx="5"/>
+          </p:nvPr>
+        </p:nvSpPr>
+        <p:spPr/>
+        <p:txBody>
+          <a:bodyPr/>
+          <a:lstStyle/>
+          <a:p>
+            <a:fld id="{A964A866-1253-4137-80B1-C0DC28C35208}" type="slidenum">
+              <a:rPr lang="en-DK" smtClean="0"/>
+              <a:t>10</a:t>
+            </a:fld>
+            <a:endParaRPr lang="en-DK"/>
+          </a:p>
+        </p:txBody>
+      </p:sp>
+    </p:spTree>
+    <p:extLst>
+      <p:ext uri="{BB962C8B-B14F-4D97-AF65-F5344CB8AC3E}">
+        <p14:creationId xmlns:p14="http://schemas.microsoft.com/office/powerpoint/2010/main" val="902534146"/>
       </p:ext>
     </p:extLst>
   </p:cSld>
@@ -705,6 +882,288 @@
 </file>
 
 <file path=ppt/notesSlides/notesSlide2.xml><?xml version="1.0" encoding="utf-8"?>
+<p:notes xmlns:a="http://schemas.openxmlformats.org/drawingml/2006/main" xmlns:r="http://schemas.openxmlformats.org/officeDocument/2006/relationships" xmlns:p="http://schemas.openxmlformats.org/presentationml/2006/main">
+  <p:cSld>
+    <p:spTree>
+      <p:nvGrpSpPr>
+        <p:cNvPr id="1" name="">
+          <a:extLst>
+            <a:ext uri="{FF2B5EF4-FFF2-40B4-BE49-F238E27FC236}">
+              <a16:creationId xmlns:a16="http://schemas.microsoft.com/office/drawing/2014/main" id="{35E0DBFC-63B2-D63D-2554-DB97A43B4FDE}"/>
+            </a:ext>
+          </a:extLst>
+        </p:cNvPr>
+        <p:cNvGrpSpPr/>
+        <p:nvPr/>
+      </p:nvGrpSpPr>
+      <p:grpSpPr>
+        <a:xfrm>
+          <a:off x="0" y="0"/>
+          <a:ext cx="0" cy="0"/>
+          <a:chOff x="0" y="0"/>
+          <a:chExt cx="0" cy="0"/>
+        </a:xfrm>
+      </p:grpSpPr>
+      <p:sp>
+        <p:nvSpPr>
+          <p:cNvPr id="2" name="Slide Image Placeholder 1">
+            <a:extLst>
+              <a:ext uri="{FF2B5EF4-FFF2-40B4-BE49-F238E27FC236}">
+                <a16:creationId xmlns:a16="http://schemas.microsoft.com/office/drawing/2014/main" id="{B4D8D80C-34EE-E265-2C6C-6F5161E55D2A}"/>
+              </a:ext>
+            </a:extLst>
+          </p:cNvPr>
+          <p:cNvSpPr>
+            <a:spLocks noGrp="1" noRot="1" noChangeAspect="1"/>
+          </p:cNvSpPr>
+          <p:nvPr>
+            <p:ph type="sldImg"/>
+          </p:nvPr>
+        </p:nvSpPr>
+        <p:spPr/>
+      </p:sp>
+      <p:sp>
+        <p:nvSpPr>
+          <p:cNvPr id="3" name="Notes Placeholder 2">
+            <a:extLst>
+              <a:ext uri="{FF2B5EF4-FFF2-40B4-BE49-F238E27FC236}">
+                <a16:creationId xmlns:a16="http://schemas.microsoft.com/office/drawing/2014/main" id="{F740A324-7F07-B8CA-BA1D-9EA860769F00}"/>
+              </a:ext>
+            </a:extLst>
+          </p:cNvPr>
+          <p:cNvSpPr>
+            <a:spLocks noGrp="1"/>
+          </p:cNvSpPr>
+          <p:nvPr>
+            <p:ph type="body" idx="1"/>
+          </p:nvPr>
+        </p:nvSpPr>
+        <p:spPr/>
+        <p:txBody>
+          <a:bodyPr/>
+          <a:lstStyle/>
+          <a:p>
+            <a:pPr marL="0" marR="0" lvl="0" indent="0" algn="l" defTabSz="914400" rtl="0" eaLnBrk="1" fontAlgn="auto" latinLnBrk="0" hangingPunct="1">
+              <a:lnSpc>
+                <a:spcPct val="100000"/>
+              </a:lnSpc>
+              <a:spcBef>
+                <a:spcPts val="0"/>
+              </a:spcBef>
+              <a:spcAft>
+                <a:spcPts val="0"/>
+              </a:spcAft>
+              <a:buClrTx/>
+              <a:buSzTx/>
+              <a:buFontTx/>
+              <a:buNone/>
+              <a:tabLst/>
+              <a:defRPr/>
+            </a:pPr>
+            <a:r>
+              <a:rPr lang="en-GB" b="0" dirty="0">
+                <a:solidFill>
+                  <a:srgbClr val="CE9178"/>
+                </a:solidFill>
+                <a:effectLst/>
+                <a:latin typeface="Fira Code" pitchFamily="1" charset="0"/>
+              </a:rPr>
+              <a:t>ScreenPositionInstruction.png</a:t>
+            </a:r>
+            <a:endParaRPr lang="en-GB" b="0" dirty="0">
+              <a:solidFill>
+                <a:srgbClr val="D4D4D4"/>
+              </a:solidFill>
+              <a:effectLst/>
+              <a:latin typeface="Fira Code" pitchFamily="1" charset="0"/>
+            </a:endParaRPr>
+          </a:p>
+        </p:txBody>
+      </p:sp>
+      <p:sp>
+        <p:nvSpPr>
+          <p:cNvPr id="4" name="Slide Number Placeholder 3">
+            <a:extLst>
+              <a:ext uri="{FF2B5EF4-FFF2-40B4-BE49-F238E27FC236}">
+                <a16:creationId xmlns:a16="http://schemas.microsoft.com/office/drawing/2014/main" id="{0B0C9B8E-3687-BC5E-C912-437A45D4DC71}"/>
+              </a:ext>
+            </a:extLst>
+          </p:cNvPr>
+          <p:cNvSpPr>
+            <a:spLocks noGrp="1"/>
+          </p:cNvSpPr>
+          <p:nvPr>
+            <p:ph type="sldNum" sz="quarter" idx="5"/>
+          </p:nvPr>
+        </p:nvSpPr>
+        <p:spPr/>
+        <p:txBody>
+          <a:bodyPr/>
+          <a:lstStyle/>
+          <a:p>
+            <a:fld id="{A964A866-1253-4137-80B1-C0DC28C35208}" type="slidenum">
+              <a:rPr lang="en-DK" smtClean="0"/>
+              <a:t>2</a:t>
+            </a:fld>
+            <a:endParaRPr lang="en-DK"/>
+          </a:p>
+        </p:txBody>
+      </p:sp>
+    </p:spTree>
+    <p:extLst>
+      <p:ext uri="{BB962C8B-B14F-4D97-AF65-F5344CB8AC3E}">
+        <p14:creationId xmlns:p14="http://schemas.microsoft.com/office/powerpoint/2010/main" val="950026795"/>
+      </p:ext>
+    </p:extLst>
+  </p:cSld>
+  <p:clrMapOvr>
+    <a:masterClrMapping/>
+  </p:clrMapOvr>
+</p:notes>
+</file>
+
+<file path=ppt/notesSlides/notesSlide3.xml><?xml version="1.0" encoding="utf-8"?>
+<p:notes xmlns:a="http://schemas.openxmlformats.org/drawingml/2006/main" xmlns:r="http://schemas.openxmlformats.org/officeDocument/2006/relationships" xmlns:p="http://schemas.openxmlformats.org/presentationml/2006/main">
+  <p:cSld>
+    <p:spTree>
+      <p:nvGrpSpPr>
+        <p:cNvPr id="1" name="">
+          <a:extLst>
+            <a:ext uri="{FF2B5EF4-FFF2-40B4-BE49-F238E27FC236}">
+              <a16:creationId xmlns:a16="http://schemas.microsoft.com/office/drawing/2014/main" id="{BAC889D8-9331-E0BB-F699-3F88B90F3C4E}"/>
+            </a:ext>
+          </a:extLst>
+        </p:cNvPr>
+        <p:cNvGrpSpPr/>
+        <p:nvPr/>
+      </p:nvGrpSpPr>
+      <p:grpSpPr>
+        <a:xfrm>
+          <a:off x="0" y="0"/>
+          <a:ext cx="0" cy="0"/>
+          <a:chOff x="0" y="0"/>
+          <a:chExt cx="0" cy="0"/>
+        </a:xfrm>
+      </p:grpSpPr>
+      <p:sp>
+        <p:nvSpPr>
+          <p:cNvPr id="2" name="Slide Image Placeholder 1">
+            <a:extLst>
+              <a:ext uri="{FF2B5EF4-FFF2-40B4-BE49-F238E27FC236}">
+                <a16:creationId xmlns:a16="http://schemas.microsoft.com/office/drawing/2014/main" id="{9D6CA871-C28A-8250-E6F1-43FAEFFDA889}"/>
+              </a:ext>
+            </a:extLst>
+          </p:cNvPr>
+          <p:cNvSpPr>
+            <a:spLocks noGrp="1" noRot="1" noChangeAspect="1"/>
+          </p:cNvSpPr>
+          <p:nvPr>
+            <p:ph type="sldImg"/>
+          </p:nvPr>
+        </p:nvSpPr>
+        <p:spPr/>
+      </p:sp>
+      <p:sp>
+        <p:nvSpPr>
+          <p:cNvPr id="3" name="Notes Placeholder 2">
+            <a:extLst>
+              <a:ext uri="{FF2B5EF4-FFF2-40B4-BE49-F238E27FC236}">
+                <a16:creationId xmlns:a16="http://schemas.microsoft.com/office/drawing/2014/main" id="{F986CB7B-F4A7-ECF1-670B-6322C0EE5517}"/>
+              </a:ext>
+            </a:extLst>
+          </p:cNvPr>
+          <p:cNvSpPr>
+            <a:spLocks noGrp="1"/>
+          </p:cNvSpPr>
+          <p:nvPr>
+            <p:ph type="body" idx="1"/>
+          </p:nvPr>
+        </p:nvSpPr>
+        <p:spPr/>
+        <p:txBody>
+          <a:bodyPr/>
+          <a:lstStyle/>
+          <a:p>
+            <a:pPr marL="0" marR="0" lvl="0" indent="0" algn="l" defTabSz="914400" rtl="0" eaLnBrk="1" fontAlgn="auto" latinLnBrk="0" hangingPunct="1">
+              <a:lnSpc>
+                <a:spcPct val="100000"/>
+              </a:lnSpc>
+              <a:spcBef>
+                <a:spcPts val="0"/>
+              </a:spcBef>
+              <a:spcAft>
+                <a:spcPts val="0"/>
+              </a:spcAft>
+              <a:buClrTx/>
+              <a:buSzTx/>
+              <a:buFontTx/>
+              <a:buNone/>
+              <a:tabLst/>
+              <a:defRPr/>
+            </a:pPr>
+            <a:r>
+              <a:rPr lang="en-GB" b="0" dirty="0">
+                <a:solidFill>
+                  <a:srgbClr val="CE9178"/>
+                </a:solidFill>
+                <a:effectLst/>
+                <a:latin typeface="Fira Code" pitchFamily="1" charset="0"/>
+              </a:rPr>
+              <a:t>PositionInstruction.png</a:t>
+            </a:r>
+            <a:endParaRPr lang="en-GB" b="0" dirty="0">
+              <a:solidFill>
+                <a:srgbClr val="D4D4D4"/>
+              </a:solidFill>
+              <a:effectLst/>
+              <a:latin typeface="Fira Code" pitchFamily="1" charset="0"/>
+            </a:endParaRPr>
+          </a:p>
+        </p:txBody>
+      </p:sp>
+      <p:sp>
+        <p:nvSpPr>
+          <p:cNvPr id="4" name="Slide Number Placeholder 3">
+            <a:extLst>
+              <a:ext uri="{FF2B5EF4-FFF2-40B4-BE49-F238E27FC236}">
+                <a16:creationId xmlns:a16="http://schemas.microsoft.com/office/drawing/2014/main" id="{44F330DB-A593-37F2-CE65-40764DFA286A}"/>
+              </a:ext>
+            </a:extLst>
+          </p:cNvPr>
+          <p:cNvSpPr>
+            <a:spLocks noGrp="1"/>
+          </p:cNvSpPr>
+          <p:nvPr>
+            <p:ph type="sldNum" sz="quarter" idx="5"/>
+          </p:nvPr>
+        </p:nvSpPr>
+        <p:spPr/>
+        <p:txBody>
+          <a:bodyPr/>
+          <a:lstStyle/>
+          <a:p>
+            <a:fld id="{A964A866-1253-4137-80B1-C0DC28C35208}" type="slidenum">
+              <a:rPr lang="en-DK" smtClean="0"/>
+              <a:t>3</a:t>
+            </a:fld>
+            <a:endParaRPr lang="en-DK"/>
+          </a:p>
+        </p:txBody>
+      </p:sp>
+    </p:spTree>
+    <p:extLst>
+      <p:ext uri="{BB962C8B-B14F-4D97-AF65-F5344CB8AC3E}">
+        <p14:creationId xmlns:p14="http://schemas.microsoft.com/office/powerpoint/2010/main" val="267115430"/>
+      </p:ext>
+    </p:extLst>
+  </p:cSld>
+  <p:clrMapOvr>
+    <a:masterClrMapping/>
+  </p:clrMapOvr>
+</p:notes>
+</file>
+
+<file path=ppt/notesSlides/notesSlide4.xml><?xml version="1.0" encoding="utf-8"?>
 <p:notes xmlns:a="http://schemas.openxmlformats.org/drawingml/2006/main" xmlns:r="http://schemas.openxmlformats.org/officeDocument/2006/relationships" xmlns:p="http://schemas.openxmlformats.org/presentationml/2006/main">
   <p:cSld>
     <p:spTree>
@@ -748,7 +1207,11 @@
           <a:bodyPr/>
           <a:lstStyle/>
           <a:p>
-            <a:endParaRPr lang="en-DK" dirty="0"/>
+            <a:r>
+              <a:rPr lang="en-GB"/>
+              <a:t>Update instruction</a:t>
+            </a:r>
+            <a:endParaRPr lang="en-DK"/>
           </a:p>
         </p:txBody>
       </p:sp>
@@ -769,7 +1232,212 @@
           <a:p>
             <a:fld id="{A964A866-1253-4137-80B1-C0DC28C35208}" type="slidenum">
               <a:rPr lang="en-DK" smtClean="0"/>
-              <a:t>2</a:t>
+              <a:t>4</a:t>
+            </a:fld>
+            <a:endParaRPr lang="en-DK"/>
+          </a:p>
+        </p:txBody>
+      </p:sp>
+    </p:spTree>
+    <p:extLst>
+      <p:ext uri="{BB962C8B-B14F-4D97-AF65-F5344CB8AC3E}">
+        <p14:creationId xmlns:p14="http://schemas.microsoft.com/office/powerpoint/2010/main" val="954563150"/>
+      </p:ext>
+    </p:extLst>
+  </p:cSld>
+  <p:clrMapOvr>
+    <a:masterClrMapping/>
+  </p:clrMapOvr>
+</p:notes>
+</file>
+
+<file path=ppt/notesSlides/notesSlide5.xml><?xml version="1.0" encoding="utf-8"?>
+<p:notes xmlns:a="http://schemas.openxmlformats.org/drawingml/2006/main" xmlns:r="http://schemas.openxmlformats.org/officeDocument/2006/relationships" xmlns:p="http://schemas.openxmlformats.org/presentationml/2006/main">
+  <p:cSld>
+    <p:spTree>
+      <p:nvGrpSpPr>
+        <p:cNvPr id="1" name=""/>
+        <p:cNvGrpSpPr/>
+        <p:nvPr/>
+      </p:nvGrpSpPr>
+      <p:grpSpPr>
+        <a:xfrm>
+          <a:off x="0" y="0"/>
+          <a:ext cx="0" cy="0"/>
+          <a:chOff x="0" y="0"/>
+          <a:chExt cx="0" cy="0"/>
+        </a:xfrm>
+      </p:grpSpPr>
+      <p:sp>
+        <p:nvSpPr>
+          <p:cNvPr id="2" name="Slide Image Placeholder 1"/>
+          <p:cNvSpPr>
+            <a:spLocks noGrp="1" noRot="1" noChangeAspect="1"/>
+          </p:cNvSpPr>
+          <p:nvPr>
+            <p:ph type="sldImg"/>
+          </p:nvPr>
+        </p:nvSpPr>
+        <p:spPr/>
+      </p:sp>
+      <p:sp>
+        <p:nvSpPr>
+          <p:cNvPr id="3" name="Notes Placeholder 2"/>
+          <p:cNvSpPr>
+            <a:spLocks noGrp="1"/>
+          </p:cNvSpPr>
+          <p:nvPr>
+            <p:ph type="body" idx="1"/>
+          </p:nvPr>
+        </p:nvSpPr>
+        <p:spPr/>
+        <p:txBody>
+          <a:bodyPr/>
+          <a:lstStyle/>
+          <a:p>
+            <a:pPr marL="0" marR="0" lvl="0" indent="0" algn="l" defTabSz="914400" rtl="0" eaLnBrk="1" fontAlgn="auto" latinLnBrk="0" hangingPunct="1">
+              <a:lnSpc>
+                <a:spcPct val="100000"/>
+              </a:lnSpc>
+              <a:spcBef>
+                <a:spcPts val="0"/>
+              </a:spcBef>
+              <a:spcAft>
+                <a:spcPts val="0"/>
+              </a:spcAft>
+              <a:buClrTx/>
+              <a:buSzTx/>
+              <a:buFontTx/>
+              <a:buNone/>
+              <a:tabLst/>
+              <a:defRPr/>
+            </a:pPr>
+            <a:r>
+              <a:rPr lang="en-GB" b="0" dirty="0">
+                <a:solidFill>
+                  <a:srgbClr val="CE9178"/>
+                </a:solidFill>
+                <a:effectLst/>
+                <a:latin typeface="Fira Code" pitchFamily="1" charset="0"/>
+              </a:rPr>
+              <a:t>FiducialInstruction.png</a:t>
+            </a:r>
+            <a:endParaRPr lang="en-GB" b="0" dirty="0">
+              <a:solidFill>
+                <a:srgbClr val="D4D4D4"/>
+              </a:solidFill>
+              <a:effectLst/>
+              <a:latin typeface="Fira Code" pitchFamily="1" charset="0"/>
+            </a:endParaRPr>
+          </a:p>
+        </p:txBody>
+      </p:sp>
+      <p:sp>
+        <p:nvSpPr>
+          <p:cNvPr id="4" name="Slide Number Placeholder 3"/>
+          <p:cNvSpPr>
+            <a:spLocks noGrp="1"/>
+          </p:cNvSpPr>
+          <p:nvPr>
+            <p:ph type="sldNum" sz="quarter" idx="5"/>
+          </p:nvPr>
+        </p:nvSpPr>
+        <p:spPr/>
+        <p:txBody>
+          <a:bodyPr/>
+          <a:lstStyle/>
+          <a:p>
+            <a:fld id="{A964A866-1253-4137-80B1-C0DC28C35208}" type="slidenum">
+              <a:rPr lang="en-DK" smtClean="0"/>
+              <a:t>5</a:t>
+            </a:fld>
+            <a:endParaRPr lang="en-DK"/>
+          </a:p>
+        </p:txBody>
+      </p:sp>
+    </p:spTree>
+    <p:extLst>
+      <p:ext uri="{BB962C8B-B14F-4D97-AF65-F5344CB8AC3E}">
+        <p14:creationId xmlns:p14="http://schemas.microsoft.com/office/powerpoint/2010/main" val="3317900046"/>
+      </p:ext>
+    </p:extLst>
+  </p:cSld>
+  <p:clrMapOvr>
+    <a:masterClrMapping/>
+  </p:clrMapOvr>
+</p:notes>
+</file>
+
+<file path=ppt/notesSlides/notesSlide6.xml><?xml version="1.0" encoding="utf-8"?>
+<p:notes xmlns:a="http://schemas.openxmlformats.org/drawingml/2006/main" xmlns:r="http://schemas.openxmlformats.org/officeDocument/2006/relationships" xmlns:p="http://schemas.openxmlformats.org/presentationml/2006/main">
+  <p:cSld>
+    <p:spTree>
+      <p:nvGrpSpPr>
+        <p:cNvPr id="1" name=""/>
+        <p:cNvGrpSpPr/>
+        <p:nvPr/>
+      </p:nvGrpSpPr>
+      <p:grpSpPr>
+        <a:xfrm>
+          <a:off x="0" y="0"/>
+          <a:ext cx="0" cy="0"/>
+          <a:chOff x="0" y="0"/>
+          <a:chExt cx="0" cy="0"/>
+        </a:xfrm>
+      </p:grpSpPr>
+      <p:sp>
+        <p:nvSpPr>
+          <p:cNvPr id="2" name="Slide Image Placeholder 1"/>
+          <p:cNvSpPr>
+            <a:spLocks noGrp="1" noRot="1" noChangeAspect="1"/>
+          </p:cNvSpPr>
+          <p:nvPr>
+            <p:ph type="sldImg"/>
+          </p:nvPr>
+        </p:nvSpPr>
+        <p:spPr/>
+      </p:sp>
+      <p:sp>
+        <p:nvSpPr>
+          <p:cNvPr id="3" name="Notes Placeholder 2"/>
+          <p:cNvSpPr>
+            <a:spLocks noGrp="1"/>
+          </p:cNvSpPr>
+          <p:nvPr>
+            <p:ph type="body" idx="1"/>
+          </p:nvPr>
+        </p:nvSpPr>
+        <p:spPr/>
+        <p:txBody>
+          <a:bodyPr/>
+          <a:lstStyle/>
+          <a:p>
+            <a:r>
+              <a:rPr lang="en-GB" dirty="0"/>
+              <a:t>DetectorInstruction.png</a:t>
+            </a:r>
+            <a:endParaRPr lang="en-DK" dirty="0"/>
+          </a:p>
+        </p:txBody>
+      </p:sp>
+      <p:sp>
+        <p:nvSpPr>
+          <p:cNvPr id="4" name="Slide Number Placeholder 3"/>
+          <p:cNvSpPr>
+            <a:spLocks noGrp="1"/>
+          </p:cNvSpPr>
+          <p:nvPr>
+            <p:ph type="sldNum" sz="quarter" idx="5"/>
+          </p:nvPr>
+        </p:nvSpPr>
+        <p:spPr/>
+        <p:txBody>
+          <a:bodyPr/>
+          <a:lstStyle/>
+          <a:p>
+            <a:fld id="{A964A866-1253-4137-80B1-C0DC28C35208}" type="slidenum">
+              <a:rPr lang="en-DK" smtClean="0"/>
+              <a:t>6</a:t>
             </a:fld>
             <a:endParaRPr lang="en-DK"/>
           </a:p>
@@ -788,9 +1456,345 @@
 </p:notes>
 </file>
 
+<file path=ppt/notesSlides/notesSlide7.xml><?xml version="1.0" encoding="utf-8"?>
+<p:notes xmlns:a="http://schemas.openxmlformats.org/drawingml/2006/main" xmlns:r="http://schemas.openxmlformats.org/officeDocument/2006/relationships" xmlns:p="http://schemas.openxmlformats.org/presentationml/2006/main">
+  <p:cSld>
+    <p:spTree>
+      <p:nvGrpSpPr>
+        <p:cNvPr id="1" name="">
+          <a:extLst>
+            <a:ext uri="{FF2B5EF4-FFF2-40B4-BE49-F238E27FC236}">
+              <a16:creationId xmlns:a16="http://schemas.microsoft.com/office/drawing/2014/main" id="{8F2ACAAD-2386-0113-8380-76769FB0AD6B}"/>
+            </a:ext>
+          </a:extLst>
+        </p:cNvPr>
+        <p:cNvGrpSpPr/>
+        <p:nvPr/>
+      </p:nvGrpSpPr>
+      <p:grpSpPr>
+        <a:xfrm>
+          <a:off x="0" y="0"/>
+          <a:ext cx="0" cy="0"/>
+          <a:chOff x="0" y="0"/>
+          <a:chExt cx="0" cy="0"/>
+        </a:xfrm>
+      </p:grpSpPr>
+      <p:sp>
+        <p:nvSpPr>
+          <p:cNvPr id="2" name="Slide Image Placeholder 1">
+            <a:extLst>
+              <a:ext uri="{FF2B5EF4-FFF2-40B4-BE49-F238E27FC236}">
+                <a16:creationId xmlns:a16="http://schemas.microsoft.com/office/drawing/2014/main" id="{C5DE60DC-0AD1-BFF5-5ED4-9532117F45EE}"/>
+              </a:ext>
+            </a:extLst>
+          </p:cNvPr>
+          <p:cNvSpPr>
+            <a:spLocks noGrp="1" noRot="1" noChangeAspect="1"/>
+          </p:cNvSpPr>
+          <p:nvPr>
+            <p:ph type="sldImg"/>
+          </p:nvPr>
+        </p:nvSpPr>
+        <p:spPr/>
+      </p:sp>
+      <p:sp>
+        <p:nvSpPr>
+          <p:cNvPr id="3" name="Notes Placeholder 2">
+            <a:extLst>
+              <a:ext uri="{FF2B5EF4-FFF2-40B4-BE49-F238E27FC236}">
+                <a16:creationId xmlns:a16="http://schemas.microsoft.com/office/drawing/2014/main" id="{0DE95CD7-ACB8-D658-22AA-071940B65009}"/>
+              </a:ext>
+            </a:extLst>
+          </p:cNvPr>
+          <p:cNvSpPr>
+            <a:spLocks noGrp="1"/>
+          </p:cNvSpPr>
+          <p:nvPr>
+            <p:ph type="body" idx="1"/>
+          </p:nvPr>
+        </p:nvSpPr>
+        <p:spPr/>
+        <p:txBody>
+          <a:bodyPr/>
+          <a:lstStyle/>
+          <a:p>
+            <a:r>
+              <a:rPr lang="en-GB" dirty="0"/>
+              <a:t>S1.png</a:t>
+            </a:r>
+            <a:endParaRPr lang="en-DK" dirty="0"/>
+          </a:p>
+        </p:txBody>
+      </p:sp>
+      <p:sp>
+        <p:nvSpPr>
+          <p:cNvPr id="4" name="Slide Number Placeholder 3">
+            <a:extLst>
+              <a:ext uri="{FF2B5EF4-FFF2-40B4-BE49-F238E27FC236}">
+                <a16:creationId xmlns:a16="http://schemas.microsoft.com/office/drawing/2014/main" id="{0D80683D-7199-5411-9B7F-F3A305E619A0}"/>
+              </a:ext>
+            </a:extLst>
+          </p:cNvPr>
+          <p:cNvSpPr>
+            <a:spLocks noGrp="1"/>
+          </p:cNvSpPr>
+          <p:nvPr>
+            <p:ph type="sldNum" sz="quarter" idx="5"/>
+          </p:nvPr>
+        </p:nvSpPr>
+        <p:spPr/>
+        <p:txBody>
+          <a:bodyPr/>
+          <a:lstStyle/>
+          <a:p>
+            <a:fld id="{A964A866-1253-4137-80B1-C0DC28C35208}" type="slidenum">
+              <a:rPr lang="en-DK" smtClean="0"/>
+              <a:t>7</a:t>
+            </a:fld>
+            <a:endParaRPr lang="en-DK"/>
+          </a:p>
+        </p:txBody>
+      </p:sp>
+    </p:spTree>
+    <p:extLst>
+      <p:ext uri="{BB962C8B-B14F-4D97-AF65-F5344CB8AC3E}">
+        <p14:creationId xmlns:p14="http://schemas.microsoft.com/office/powerpoint/2010/main" val="266658572"/>
+      </p:ext>
+    </p:extLst>
+  </p:cSld>
+  <p:clrMapOvr>
+    <a:masterClrMapping/>
+  </p:clrMapOvr>
+</p:notes>
+</file>
+
+<file path=ppt/notesSlides/notesSlide8.xml><?xml version="1.0" encoding="utf-8"?>
+<p:notes xmlns:a="http://schemas.openxmlformats.org/drawingml/2006/main" xmlns:r="http://schemas.openxmlformats.org/officeDocument/2006/relationships" xmlns:p="http://schemas.openxmlformats.org/presentationml/2006/main">
+  <p:cSld>
+    <p:spTree>
+      <p:nvGrpSpPr>
+        <p:cNvPr id="1" name="">
+          <a:extLst>
+            <a:ext uri="{FF2B5EF4-FFF2-40B4-BE49-F238E27FC236}">
+              <a16:creationId xmlns:a16="http://schemas.microsoft.com/office/drawing/2014/main" id="{0487A12F-F124-384F-D1DD-29BD21A76C0C}"/>
+            </a:ext>
+          </a:extLst>
+        </p:cNvPr>
+        <p:cNvGrpSpPr/>
+        <p:nvPr/>
+      </p:nvGrpSpPr>
+      <p:grpSpPr>
+        <a:xfrm>
+          <a:off x="0" y="0"/>
+          <a:ext cx="0" cy="0"/>
+          <a:chOff x="0" y="0"/>
+          <a:chExt cx="0" cy="0"/>
+        </a:xfrm>
+      </p:grpSpPr>
+      <p:sp>
+        <p:nvSpPr>
+          <p:cNvPr id="2" name="Slide Image Placeholder 1">
+            <a:extLst>
+              <a:ext uri="{FF2B5EF4-FFF2-40B4-BE49-F238E27FC236}">
+                <a16:creationId xmlns:a16="http://schemas.microsoft.com/office/drawing/2014/main" id="{447BF6F9-6127-2F91-4991-AF6CCD5DC59E}"/>
+              </a:ext>
+            </a:extLst>
+          </p:cNvPr>
+          <p:cNvSpPr>
+            <a:spLocks noGrp="1" noRot="1" noChangeAspect="1"/>
+          </p:cNvSpPr>
+          <p:nvPr>
+            <p:ph type="sldImg"/>
+          </p:nvPr>
+        </p:nvSpPr>
+        <p:spPr/>
+      </p:sp>
+      <p:sp>
+        <p:nvSpPr>
+          <p:cNvPr id="3" name="Notes Placeholder 2">
+            <a:extLst>
+              <a:ext uri="{FF2B5EF4-FFF2-40B4-BE49-F238E27FC236}">
+                <a16:creationId xmlns:a16="http://schemas.microsoft.com/office/drawing/2014/main" id="{7211A395-538E-738D-2B93-B41717FB7AA6}"/>
+              </a:ext>
+            </a:extLst>
+          </p:cNvPr>
+          <p:cNvSpPr>
+            <a:spLocks noGrp="1"/>
+          </p:cNvSpPr>
+          <p:nvPr>
+            <p:ph type="body" idx="1"/>
+          </p:nvPr>
+        </p:nvSpPr>
+        <p:spPr/>
+        <p:txBody>
+          <a:bodyPr/>
+          <a:lstStyle/>
+          <a:p>
+            <a:r>
+              <a:rPr lang="en-GB" dirty="0"/>
+              <a:t>S2.png</a:t>
+            </a:r>
+            <a:endParaRPr lang="en-DK" dirty="0"/>
+          </a:p>
+        </p:txBody>
+      </p:sp>
+      <p:sp>
+        <p:nvSpPr>
+          <p:cNvPr id="4" name="Slide Number Placeholder 3">
+            <a:extLst>
+              <a:ext uri="{FF2B5EF4-FFF2-40B4-BE49-F238E27FC236}">
+                <a16:creationId xmlns:a16="http://schemas.microsoft.com/office/drawing/2014/main" id="{F19C8302-C839-50DB-5D56-F529C1082E8B}"/>
+              </a:ext>
+            </a:extLst>
+          </p:cNvPr>
+          <p:cNvSpPr>
+            <a:spLocks noGrp="1"/>
+          </p:cNvSpPr>
+          <p:nvPr>
+            <p:ph type="sldNum" sz="quarter" idx="5"/>
+          </p:nvPr>
+        </p:nvSpPr>
+        <p:spPr/>
+        <p:txBody>
+          <a:bodyPr/>
+          <a:lstStyle/>
+          <a:p>
+            <a:fld id="{A964A866-1253-4137-80B1-C0DC28C35208}" type="slidenum">
+              <a:rPr lang="en-DK" smtClean="0"/>
+              <a:t>8</a:t>
+            </a:fld>
+            <a:endParaRPr lang="en-DK"/>
+          </a:p>
+        </p:txBody>
+      </p:sp>
+    </p:spTree>
+    <p:extLst>
+      <p:ext uri="{BB962C8B-B14F-4D97-AF65-F5344CB8AC3E}">
+        <p14:creationId xmlns:p14="http://schemas.microsoft.com/office/powerpoint/2010/main" val="601043373"/>
+      </p:ext>
+    </p:extLst>
+  </p:cSld>
+  <p:clrMapOvr>
+    <a:masterClrMapping/>
+  </p:clrMapOvr>
+</p:notes>
+</file>
+
+<file path=ppt/notesSlides/notesSlide9.xml><?xml version="1.0" encoding="utf-8"?>
+<p:notes xmlns:a="http://schemas.openxmlformats.org/drawingml/2006/main" xmlns:r="http://schemas.openxmlformats.org/officeDocument/2006/relationships" xmlns:p="http://schemas.openxmlformats.org/presentationml/2006/main">
+  <p:cSld>
+    <p:spTree>
+      <p:nvGrpSpPr>
+        <p:cNvPr id="1" name="">
+          <a:extLst>
+            <a:ext uri="{FF2B5EF4-FFF2-40B4-BE49-F238E27FC236}">
+              <a16:creationId xmlns:a16="http://schemas.microsoft.com/office/drawing/2014/main" id="{4F1E111C-6133-A14D-0A44-9EDDB09C3B0D}"/>
+            </a:ext>
+          </a:extLst>
+        </p:cNvPr>
+        <p:cNvGrpSpPr/>
+        <p:nvPr/>
+      </p:nvGrpSpPr>
+      <p:grpSpPr>
+        <a:xfrm>
+          <a:off x="0" y="0"/>
+          <a:ext cx="0" cy="0"/>
+          <a:chOff x="0" y="0"/>
+          <a:chExt cx="0" cy="0"/>
+        </a:xfrm>
+      </p:grpSpPr>
+      <p:sp>
+        <p:nvSpPr>
+          <p:cNvPr id="2" name="Slide Image Placeholder 1">
+            <a:extLst>
+              <a:ext uri="{FF2B5EF4-FFF2-40B4-BE49-F238E27FC236}">
+                <a16:creationId xmlns:a16="http://schemas.microsoft.com/office/drawing/2014/main" id="{3C950296-88A6-62D7-2E7B-2C947B8A578A}"/>
+              </a:ext>
+            </a:extLst>
+          </p:cNvPr>
+          <p:cNvSpPr>
+            <a:spLocks noGrp="1" noRot="1" noChangeAspect="1"/>
+          </p:cNvSpPr>
+          <p:nvPr>
+            <p:ph type="sldImg"/>
+          </p:nvPr>
+        </p:nvSpPr>
+        <p:spPr/>
+      </p:sp>
+      <p:sp>
+        <p:nvSpPr>
+          <p:cNvPr id="3" name="Notes Placeholder 2">
+            <a:extLst>
+              <a:ext uri="{FF2B5EF4-FFF2-40B4-BE49-F238E27FC236}">
+                <a16:creationId xmlns:a16="http://schemas.microsoft.com/office/drawing/2014/main" id="{A5843AA2-6874-9EAD-1FA2-61C6ABBDC1A3}"/>
+              </a:ext>
+            </a:extLst>
+          </p:cNvPr>
+          <p:cNvSpPr>
+            <a:spLocks noGrp="1"/>
+          </p:cNvSpPr>
+          <p:nvPr>
+            <p:ph type="body" idx="1"/>
+          </p:nvPr>
+        </p:nvSpPr>
+        <p:spPr/>
+        <p:txBody>
+          <a:bodyPr/>
+          <a:lstStyle/>
+          <a:p>
+            <a:r>
+              <a:rPr lang="en-GB" dirty="0"/>
+              <a:t>S3.png</a:t>
+            </a:r>
+            <a:endParaRPr lang="en-DK" dirty="0"/>
+          </a:p>
+        </p:txBody>
+      </p:sp>
+      <p:sp>
+        <p:nvSpPr>
+          <p:cNvPr id="4" name="Slide Number Placeholder 3">
+            <a:extLst>
+              <a:ext uri="{FF2B5EF4-FFF2-40B4-BE49-F238E27FC236}">
+                <a16:creationId xmlns:a16="http://schemas.microsoft.com/office/drawing/2014/main" id="{31A00B5D-8676-F5FC-4DE9-E66ADCD9C5E4}"/>
+              </a:ext>
+            </a:extLst>
+          </p:cNvPr>
+          <p:cNvSpPr>
+            <a:spLocks noGrp="1"/>
+          </p:cNvSpPr>
+          <p:nvPr>
+            <p:ph type="sldNum" sz="quarter" idx="5"/>
+          </p:nvPr>
+        </p:nvSpPr>
+        <p:spPr/>
+        <p:txBody>
+          <a:bodyPr/>
+          <a:lstStyle/>
+          <a:p>
+            <a:fld id="{A964A866-1253-4137-80B1-C0DC28C35208}" type="slidenum">
+              <a:rPr lang="en-DK" smtClean="0"/>
+              <a:t>9</a:t>
+            </a:fld>
+            <a:endParaRPr lang="en-DK"/>
+          </a:p>
+        </p:txBody>
+      </p:sp>
+    </p:spTree>
+    <p:extLst>
+      <p:ext uri="{BB962C8B-B14F-4D97-AF65-F5344CB8AC3E}">
+        <p14:creationId xmlns:p14="http://schemas.microsoft.com/office/powerpoint/2010/main" val="200499602"/>
+      </p:ext>
+    </p:extLst>
+  </p:cSld>
+  <p:clrMapOvr>
+    <a:masterClrMapping/>
+  </p:clrMapOvr>
+</p:notes>
+</file>
+
 <file path=ppt/slideLayouts/slideLayout1.xml><?xml version="1.0" encoding="utf-8"?>
 <p:sldLayout xmlns:a="http://schemas.openxmlformats.org/drawingml/2006/main" xmlns:r="http://schemas.openxmlformats.org/officeDocument/2006/relationships" xmlns:p="http://schemas.openxmlformats.org/presentationml/2006/main" preserve="1" userDrawn="1">
-  <p:cSld name="Blank">
+  <p:cSld name="Blank (Black background)">
     <p:spTree>
       <p:nvGrpSpPr>
         <p:cNvPr id="1" name=""/>
@@ -820,7 +1824,12 @@
 
 <file path=ppt/slideLayouts/slideLayout2.xml><?xml version="1.0" encoding="utf-8"?>
 <p:sldLayout xmlns:a="http://schemas.openxmlformats.org/drawingml/2006/main" xmlns:r="http://schemas.openxmlformats.org/officeDocument/2006/relationships" xmlns:p="http://schemas.openxmlformats.org/presentationml/2006/main" preserve="1" userDrawn="1">
-  <p:cSld name="Fiducial (27&quot;)">
+  <p:cSld name="Blank (White Backgound)">
+    <p:bg>
+      <p:bgRef idx="1001">
+        <a:schemeClr val="bg1"/>
+      </p:bgRef>
+    </p:bg>
     <p:spTree>
       <p:nvGrpSpPr>
         <p:cNvPr id="1" name=""/>
@@ -835,149 +1844,15 @@
           <a:chExt cx="0" cy="0"/>
         </a:xfrm>
       </p:grpSpPr>
-      <p:sp>
-        <p:nvSpPr>
-          <p:cNvPr id="2" name="Oval 1">
-            <a:extLst>
-              <a:ext uri="{FF2B5EF4-FFF2-40B4-BE49-F238E27FC236}">
-                <a16:creationId xmlns:a16="http://schemas.microsoft.com/office/drawing/2014/main" id="{D70C5DF6-CD1F-55C9-DC77-11582FC30E39}"/>
-              </a:ext>
-            </a:extLst>
-          </p:cNvPr>
-          <p:cNvSpPr/>
-          <p:nvPr userDrawn="1"/>
-        </p:nvSpPr>
-        <p:spPr>
-          <a:xfrm>
-            <a:off x="11529753" y="167730"/>
-            <a:ext cx="472423" cy="447411"/>
-          </a:xfrm>
-          <a:prstGeom prst="ellipse">
-            <a:avLst/>
-          </a:prstGeom>
-          <a:solidFill>
-            <a:srgbClr val="FFFFFF"/>
-          </a:solidFill>
-          <a:ln>
-            <a:noFill/>
-          </a:ln>
-        </p:spPr>
-        <p:style>
-          <a:lnRef idx="2">
-            <a:schemeClr val="accent1">
-              <a:shade val="15000"/>
-            </a:schemeClr>
-          </a:lnRef>
-          <a:fillRef idx="1">
-            <a:schemeClr val="accent1"/>
-          </a:fillRef>
-          <a:effectRef idx="0">
-            <a:schemeClr val="accent1"/>
-          </a:effectRef>
-          <a:fontRef idx="minor">
-            <a:schemeClr val="lt1"/>
-          </a:fontRef>
-        </p:style>
-        <p:txBody>
-          <a:bodyPr rtlCol="0" anchor="ctr"/>
-          <a:lstStyle/>
-          <a:p>
-            <a:pPr algn="ctr"/>
-            <a:endParaRPr lang="en-DK"/>
-          </a:p>
-        </p:txBody>
-      </p:sp>
     </p:spTree>
     <p:extLst>
       <p:ext uri="{BB962C8B-B14F-4D97-AF65-F5344CB8AC3E}">
-        <p14:creationId xmlns:p14="http://schemas.microsoft.com/office/powerpoint/2010/main" val="3897079236"/>
+        <p14:creationId xmlns:p14="http://schemas.microsoft.com/office/powerpoint/2010/main" val="2038805433"/>
       </p:ext>
     </p:extLst>
   </p:cSld>
   <p:clrMapOvr>
-    <a:masterClrMapping/>
-  </p:clrMapOvr>
-</p:sldLayout>
-</file>
-
-<file path=ppt/slideLayouts/slideLayout3.xml><?xml version="1.0" encoding="utf-8"?>
-<p:sldLayout xmlns:a="http://schemas.openxmlformats.org/drawingml/2006/main" xmlns:r="http://schemas.openxmlformats.org/officeDocument/2006/relationships" xmlns:p="http://schemas.openxmlformats.org/presentationml/2006/main" preserve="1" userDrawn="1">
-  <p:cSld name="1_Fiducial (24&quot;)">
-    <p:spTree>
-      <p:nvGrpSpPr>
-        <p:cNvPr id="1" name=""/>
-        <p:cNvGrpSpPr/>
-        <p:nvPr/>
-      </p:nvGrpSpPr>
-      <p:grpSpPr>
-        <a:xfrm>
-          <a:off x="0" y="0"/>
-          <a:ext cx="0" cy="0"/>
-          <a:chOff x="0" y="0"/>
-          <a:chExt cx="0" cy="0"/>
-        </a:xfrm>
-      </p:grpSpPr>
-      <p:sp>
-        <p:nvSpPr>
-          <p:cNvPr id="2" name="Oval 1">
-            <a:extLst>
-              <a:ext uri="{FF2B5EF4-FFF2-40B4-BE49-F238E27FC236}">
-                <a16:creationId xmlns:a16="http://schemas.microsoft.com/office/drawing/2014/main" id="{30EC4258-E658-AA42-C0FE-69BD278F5F67}"/>
-              </a:ext>
-            </a:extLst>
-          </p:cNvPr>
-          <p:cNvSpPr/>
-          <p:nvPr userDrawn="1"/>
-        </p:nvSpPr>
-        <p:spPr>
-          <a:xfrm>
-            <a:off x="11529753" y="167730"/>
-            <a:ext cx="472423" cy="447411"/>
-          </a:xfrm>
-          <a:prstGeom prst="ellipse">
-            <a:avLst/>
-          </a:prstGeom>
-          <a:solidFill>
-            <a:srgbClr val="FFFFFF"/>
-          </a:solidFill>
-          <a:ln>
-            <a:noFill/>
-          </a:ln>
-        </p:spPr>
-        <p:style>
-          <a:lnRef idx="2">
-            <a:schemeClr val="accent1">
-              <a:shade val="15000"/>
-            </a:schemeClr>
-          </a:lnRef>
-          <a:fillRef idx="1">
-            <a:schemeClr val="accent1"/>
-          </a:fillRef>
-          <a:effectRef idx="0">
-            <a:schemeClr val="accent1"/>
-          </a:effectRef>
-          <a:fontRef idx="minor">
-            <a:schemeClr val="lt1"/>
-          </a:fontRef>
-        </p:style>
-        <p:txBody>
-          <a:bodyPr rtlCol="0" anchor="ctr"/>
-          <a:lstStyle/>
-          <a:p>
-            <a:pPr algn="ctr"/>
-            <a:endParaRPr lang="en-DK"/>
-          </a:p>
-        </p:txBody>
-      </p:sp>
-    </p:spTree>
-    <p:extLst>
-      <p:ext uri="{BB962C8B-B14F-4D97-AF65-F5344CB8AC3E}">
-        <p14:creationId xmlns:p14="http://schemas.microsoft.com/office/powerpoint/2010/main" val="272858804"/>
-      </p:ext>
-    </p:extLst>
-  </p:cSld>
-  <p:clrMapOvr>
-    <a:masterClrMapping/>
+    <a:overrideClrMapping bg1="lt1" tx1="dk1" bg2="lt2" tx2="dk2" accent1="accent1" accent2="accent2" accent3="accent3" accent4="accent4" accent5="accent5" accent6="accent6" hlink="hlink" folHlink="folHlink"/>
   </p:clrMapOvr>
 </p:sldLayout>
 </file>
@@ -1015,7 +1890,6 @@
   <p:sldLayoutIdLst>
     <p:sldLayoutId id="2147483649" r:id="rId1"/>
     <p:sldLayoutId id="2147483650" r:id="rId2"/>
-    <p:sldLayoutId id="2147483651" r:id="rId3"/>
   </p:sldLayoutIdLst>
   <p:txStyles>
     <p:titleStyle>
@@ -1305,7 +2179,13 @@
   <p:cSld>
     <p:spTree>
       <p:nvGrpSpPr>
-        <p:cNvPr id="1" name=""/>
+        <p:cNvPr id="1" name="">
+          <a:extLst>
+            <a:ext uri="{FF2B5EF4-FFF2-40B4-BE49-F238E27FC236}">
+              <a16:creationId xmlns:a16="http://schemas.microsoft.com/office/drawing/2014/main" id="{26562B8A-1B9B-7BFC-2E9C-707915176BA2}"/>
+            </a:ext>
+          </a:extLst>
+        </p:cNvPr>
         <p:cNvGrpSpPr/>
         <p:nvPr/>
       </p:nvGrpSpPr>
@@ -1317,12 +2197,57 @@
           <a:chExt cx="0" cy="0"/>
         </a:xfrm>
       </p:grpSpPr>
-      <p:sp>
-        <p:nvSpPr>
-          <p:cNvPr id="2" name="TextBox 1">
+      <p:cxnSp>
+        <p:nvCxnSpPr>
+          <p:cNvPr id="6" name="Straight Arrow Connector 5">
             <a:extLst>
               <a:ext uri="{FF2B5EF4-FFF2-40B4-BE49-F238E27FC236}">
-                <a16:creationId xmlns:a16="http://schemas.microsoft.com/office/drawing/2014/main" id="{460438F3-F864-32F1-9E2B-21D621285109}"/>
+                <a16:creationId xmlns:a16="http://schemas.microsoft.com/office/drawing/2014/main" id="{741A736B-D36E-E80D-2550-33D9287145EF}"/>
+              </a:ext>
+            </a:extLst>
+          </p:cNvPr>
+          <p:cNvCxnSpPr>
+            <a:cxnSpLocks/>
+          </p:cNvCxnSpPr>
+          <p:nvPr/>
+        </p:nvCxnSpPr>
+        <p:spPr>
+          <a:xfrm flipH="1">
+            <a:off x="0" y="0"/>
+            <a:ext cx="12192000" cy="6858000"/>
+          </a:xfrm>
+          <a:prstGeom prst="straightConnector1">
+            <a:avLst/>
+          </a:prstGeom>
+          <a:ln w="76200">
+            <a:solidFill>
+              <a:schemeClr val="tx1"/>
+            </a:solidFill>
+            <a:headEnd type="triangle"/>
+            <a:tailEnd type="triangle"/>
+          </a:ln>
+        </p:spPr>
+        <p:style>
+          <a:lnRef idx="1">
+            <a:schemeClr val="accent1"/>
+          </a:lnRef>
+          <a:fillRef idx="0">
+            <a:schemeClr val="accent1"/>
+          </a:fillRef>
+          <a:effectRef idx="0">
+            <a:schemeClr val="accent1"/>
+          </a:effectRef>
+          <a:fontRef idx="minor">
+            <a:schemeClr val="tx1"/>
+          </a:fontRef>
+        </p:style>
+      </p:cxnSp>
+      <p:sp>
+        <p:nvSpPr>
+          <p:cNvPr id="8" name="TextBox 7">
+            <a:extLst>
+              <a:ext uri="{FF2B5EF4-FFF2-40B4-BE49-F238E27FC236}">
+                <a16:creationId xmlns:a16="http://schemas.microsoft.com/office/drawing/2014/main" id="{2CD95F7B-4E85-A9AA-968B-687D9A429297}"/>
               </a:ext>
             </a:extLst>
           </p:cNvPr>
@@ -1330,9 +2255,9 @@
           <p:nvPr/>
         </p:nvSpPr>
         <p:spPr>
-          <a:xfrm>
-            <a:off x="3477944" y="2988527"/>
-            <a:ext cx="5236113" cy="523220"/>
+          <a:xfrm rot="19826278">
+            <a:off x="2839098" y="2619945"/>
+            <a:ext cx="7226915" cy="523220"/>
           </a:xfrm>
           <a:prstGeom prst="rect">
             <a:avLst/>
@@ -1347,7 +2272,7 @@
           <a:p>
             <a:r>
               <a:rPr lang="en-GB" sz="2800" dirty="0"/>
-              <a:t>Start the test to generate a fiducial</a:t>
+              <a:t>Measure the length of the screen diagonal in cm</a:t>
             </a:r>
             <a:endParaRPr lang="en-DK" sz="2800" dirty="0"/>
           </a:p>
@@ -1356,7 +2281,79 @@
     </p:spTree>
     <p:extLst>
       <p:ext uri="{BB962C8B-B14F-4D97-AF65-F5344CB8AC3E}">
-        <p14:creationId xmlns:p14="http://schemas.microsoft.com/office/powerpoint/2010/main" val="2220615399"/>
+        <p14:creationId xmlns:p14="http://schemas.microsoft.com/office/powerpoint/2010/main" val="1571191705"/>
+      </p:ext>
+    </p:extLst>
+  </p:cSld>
+  <p:clrMapOvr>
+    <a:masterClrMapping/>
+  </p:clrMapOvr>
+</p:sld>
+</file>
+
+<file path=ppt/slides/slide10.xml><?xml version="1.0" encoding="utf-8"?>
+<p:sld xmlns:a="http://schemas.openxmlformats.org/drawingml/2006/main" xmlns:r="http://schemas.openxmlformats.org/officeDocument/2006/relationships" xmlns:p="http://schemas.openxmlformats.org/presentationml/2006/main">
+  <p:cSld>
+    <p:spTree>
+      <p:nvGrpSpPr>
+        <p:cNvPr id="1" name="">
+          <a:extLst>
+            <a:ext uri="{FF2B5EF4-FFF2-40B4-BE49-F238E27FC236}">
+              <a16:creationId xmlns:a16="http://schemas.microsoft.com/office/drawing/2014/main" id="{FCE391B3-5D60-7251-3074-BA8003BAC9D2}"/>
+            </a:ext>
+          </a:extLst>
+        </p:cNvPr>
+        <p:cNvGrpSpPr/>
+        <p:nvPr/>
+      </p:nvGrpSpPr>
+      <p:grpSpPr>
+        <a:xfrm>
+          <a:off x="0" y="0"/>
+          <a:ext cx="0" cy="0"/>
+          <a:chOff x="0" y="0"/>
+          <a:chExt cx="0" cy="0"/>
+        </a:xfrm>
+      </p:grpSpPr>
+      <p:sp>
+        <p:nvSpPr>
+          <p:cNvPr id="3" name="TextBox 2">
+            <a:extLst>
+              <a:ext uri="{FF2B5EF4-FFF2-40B4-BE49-F238E27FC236}">
+                <a16:creationId xmlns:a16="http://schemas.microsoft.com/office/drawing/2014/main" id="{DCE65957-AA55-39E9-1A8C-A2A0E451FC0E}"/>
+              </a:ext>
+            </a:extLst>
+          </p:cNvPr>
+          <p:cNvSpPr txBox="1"/>
+          <p:nvPr/>
+        </p:nvSpPr>
+        <p:spPr>
+          <a:xfrm>
+            <a:off x="5464257" y="2105561"/>
+            <a:ext cx="1263487" cy="2646878"/>
+          </a:xfrm>
+          <a:prstGeom prst="rect">
+            <a:avLst/>
+          </a:prstGeom>
+          <a:noFill/>
+        </p:spPr>
+        <p:txBody>
+          <a:bodyPr wrap="none" rtlCol="0">
+            <a:spAutoFit/>
+          </a:bodyPr>
+          <a:lstStyle/>
+          <a:p>
+            <a:r>
+              <a:rPr lang="en-GB" sz="16600" dirty="0"/>
+              <a:t>4</a:t>
+            </a:r>
+            <a:endParaRPr lang="en-DK" sz="16600" dirty="0"/>
+          </a:p>
+        </p:txBody>
+      </p:sp>
+    </p:spTree>
+    <p:extLst>
+      <p:ext uri="{BB962C8B-B14F-4D97-AF65-F5344CB8AC3E}">
+        <p14:creationId xmlns:p14="http://schemas.microsoft.com/office/powerpoint/2010/main" val="2816438011"/>
       </p:ext>
     </p:extLst>
   </p:cSld>
@@ -1367,6 +2364,359 @@
 </file>
 
 <file path=ppt/slides/slide2.xml><?xml version="1.0" encoding="utf-8"?>
+<p:sld xmlns:a="http://schemas.openxmlformats.org/drawingml/2006/main" xmlns:r="http://schemas.openxmlformats.org/officeDocument/2006/relationships" xmlns:p="http://schemas.openxmlformats.org/presentationml/2006/main">
+  <p:cSld>
+    <p:spTree>
+      <p:nvGrpSpPr>
+        <p:cNvPr id="1" name="">
+          <a:extLst>
+            <a:ext uri="{FF2B5EF4-FFF2-40B4-BE49-F238E27FC236}">
+              <a16:creationId xmlns:a16="http://schemas.microsoft.com/office/drawing/2014/main" id="{E66AA855-4980-F317-0EBC-7F9EA5C7FC48}"/>
+            </a:ext>
+          </a:extLst>
+        </p:cNvPr>
+        <p:cNvGrpSpPr/>
+        <p:nvPr/>
+      </p:nvGrpSpPr>
+      <p:grpSpPr>
+        <a:xfrm>
+          <a:off x="0" y="0"/>
+          <a:ext cx="0" cy="0"/>
+          <a:chOff x="0" y="0"/>
+          <a:chExt cx="0" cy="0"/>
+        </a:xfrm>
+      </p:grpSpPr>
+      <p:pic>
+        <p:nvPicPr>
+          <p:cNvPr id="3" name="Picture 2">
+            <a:extLst>
+              <a:ext uri="{FF2B5EF4-FFF2-40B4-BE49-F238E27FC236}">
+                <a16:creationId xmlns:a16="http://schemas.microsoft.com/office/drawing/2014/main" id="{805C03C7-3259-8E3C-BAD4-97B632D13083}"/>
+              </a:ext>
+            </a:extLst>
+          </p:cNvPr>
+          <p:cNvPicPr>
+            <a:picLocks noChangeAspect="1"/>
+          </p:cNvPicPr>
+          <p:nvPr/>
+        </p:nvPicPr>
+        <p:blipFill>
+          <a:blip r:embed="rId3"/>
+          <a:stretch>
+            <a:fillRect/>
+          </a:stretch>
+        </p:blipFill>
+        <p:spPr>
+          <a:xfrm>
+            <a:off x="2640997" y="1040644"/>
+            <a:ext cx="6910006" cy="5645906"/>
+          </a:xfrm>
+          <a:prstGeom prst="rect">
+            <a:avLst/>
+          </a:prstGeom>
+        </p:spPr>
+      </p:pic>
+      <p:sp>
+        <p:nvSpPr>
+          <p:cNvPr id="4" name="TextBox 3">
+            <a:extLst>
+              <a:ext uri="{FF2B5EF4-FFF2-40B4-BE49-F238E27FC236}">
+                <a16:creationId xmlns:a16="http://schemas.microsoft.com/office/drawing/2014/main" id="{9DC79E11-D4A6-3052-62DF-99CFF554C910}"/>
+              </a:ext>
+            </a:extLst>
+          </p:cNvPr>
+          <p:cNvSpPr txBox="1"/>
+          <p:nvPr/>
+        </p:nvSpPr>
+        <p:spPr>
+          <a:xfrm>
+            <a:off x="1341429" y="416026"/>
+            <a:ext cx="9509142" cy="523220"/>
+          </a:xfrm>
+          <a:prstGeom prst="rect">
+            <a:avLst/>
+          </a:prstGeom>
+          <a:noFill/>
+        </p:spPr>
+        <p:txBody>
+          <a:bodyPr wrap="none" rtlCol="0">
+            <a:spAutoFit/>
+          </a:bodyPr>
+          <a:lstStyle/>
+          <a:p>
+            <a:r>
+              <a:rPr lang="en-GB" sz="2800" dirty="0"/>
+              <a:t>Measure the distance from the eyes of the subject to the screen</a:t>
+            </a:r>
+            <a:endParaRPr lang="en-DK" sz="2800" dirty="0"/>
+          </a:p>
+        </p:txBody>
+      </p:sp>
+      <p:cxnSp>
+        <p:nvCxnSpPr>
+          <p:cNvPr id="7" name="Straight Arrow Connector 6">
+            <a:extLst>
+              <a:ext uri="{FF2B5EF4-FFF2-40B4-BE49-F238E27FC236}">
+                <a16:creationId xmlns:a16="http://schemas.microsoft.com/office/drawing/2014/main" id="{0DE76607-92CC-E9BC-489B-16D0B5431953}"/>
+              </a:ext>
+            </a:extLst>
+          </p:cNvPr>
+          <p:cNvCxnSpPr/>
+          <p:nvPr/>
+        </p:nvCxnSpPr>
+        <p:spPr>
+          <a:xfrm>
+            <a:off x="4604657" y="1934936"/>
+            <a:ext cx="3053443" cy="0"/>
+          </a:xfrm>
+          <a:prstGeom prst="straightConnector1">
+            <a:avLst/>
+          </a:prstGeom>
+          <a:ln w="76200">
+            <a:solidFill>
+              <a:schemeClr val="tx1"/>
+            </a:solidFill>
+            <a:headEnd type="triangle"/>
+            <a:tailEnd type="triangle"/>
+          </a:ln>
+        </p:spPr>
+        <p:style>
+          <a:lnRef idx="1">
+            <a:schemeClr val="accent1"/>
+          </a:lnRef>
+          <a:fillRef idx="0">
+            <a:schemeClr val="accent1"/>
+          </a:fillRef>
+          <a:effectRef idx="0">
+            <a:schemeClr val="accent1"/>
+          </a:effectRef>
+          <a:fontRef idx="minor">
+            <a:schemeClr val="tx1"/>
+          </a:fontRef>
+        </p:style>
+      </p:cxnSp>
+      <p:sp>
+        <p:nvSpPr>
+          <p:cNvPr id="9" name="TextBox 8">
+            <a:extLst>
+              <a:ext uri="{FF2B5EF4-FFF2-40B4-BE49-F238E27FC236}">
+                <a16:creationId xmlns:a16="http://schemas.microsoft.com/office/drawing/2014/main" id="{4EB82AC6-B6DF-EDDA-A524-D5ABD8D6AC9D}"/>
+              </a:ext>
+            </a:extLst>
+          </p:cNvPr>
+          <p:cNvSpPr txBox="1"/>
+          <p:nvPr/>
+        </p:nvSpPr>
+        <p:spPr>
+          <a:xfrm>
+            <a:off x="5356454" y="1514905"/>
+            <a:ext cx="1549848" cy="369332"/>
+          </a:xfrm>
+          <a:prstGeom prst="rect">
+            <a:avLst/>
+          </a:prstGeom>
+          <a:noFill/>
+        </p:spPr>
+        <p:txBody>
+          <a:bodyPr wrap="none" rtlCol="0">
+            <a:spAutoFit/>
+          </a:bodyPr>
+          <a:lstStyle/>
+          <a:p>
+            <a:r>
+              <a:rPr lang="en-GB" dirty="0"/>
+              <a:t>Distance in cm</a:t>
+            </a:r>
+            <a:endParaRPr lang="en-DK" dirty="0"/>
+          </a:p>
+        </p:txBody>
+      </p:sp>
+    </p:spTree>
+    <p:extLst>
+      <p:ext uri="{BB962C8B-B14F-4D97-AF65-F5344CB8AC3E}">
+        <p14:creationId xmlns:p14="http://schemas.microsoft.com/office/powerpoint/2010/main" val="1866904944"/>
+      </p:ext>
+    </p:extLst>
+  </p:cSld>
+  <p:clrMapOvr>
+    <a:masterClrMapping/>
+  </p:clrMapOvr>
+</p:sld>
+</file>
+
+<file path=ppt/slides/slide3.xml><?xml version="1.0" encoding="utf-8"?>
+<p:sld xmlns:a="http://schemas.openxmlformats.org/drawingml/2006/main" xmlns:r="http://schemas.openxmlformats.org/officeDocument/2006/relationships" xmlns:p="http://schemas.openxmlformats.org/presentationml/2006/main">
+  <p:cSld>
+    <p:spTree>
+      <p:nvGrpSpPr>
+        <p:cNvPr id="1" name="">
+          <a:extLst>
+            <a:ext uri="{FF2B5EF4-FFF2-40B4-BE49-F238E27FC236}">
+              <a16:creationId xmlns:a16="http://schemas.microsoft.com/office/drawing/2014/main" id="{74A63BEC-912B-ED1F-3079-49650730EA3C}"/>
+            </a:ext>
+          </a:extLst>
+        </p:cNvPr>
+        <p:cNvGrpSpPr/>
+        <p:nvPr/>
+      </p:nvGrpSpPr>
+      <p:grpSpPr>
+        <a:xfrm>
+          <a:off x="0" y="0"/>
+          <a:ext cx="0" cy="0"/>
+          <a:chOff x="0" y="0"/>
+          <a:chExt cx="0" cy="0"/>
+        </a:xfrm>
+      </p:grpSpPr>
+      <p:sp>
+        <p:nvSpPr>
+          <p:cNvPr id="2" name="TextBox 1">
+            <a:extLst>
+              <a:ext uri="{FF2B5EF4-FFF2-40B4-BE49-F238E27FC236}">
+                <a16:creationId xmlns:a16="http://schemas.microsoft.com/office/drawing/2014/main" id="{B34FBA23-A339-C7AD-8468-BA145DAEC6CC}"/>
+              </a:ext>
+            </a:extLst>
+          </p:cNvPr>
+          <p:cNvSpPr txBox="1"/>
+          <p:nvPr/>
+        </p:nvSpPr>
+        <p:spPr>
+          <a:xfrm>
+            <a:off x="1034518" y="432355"/>
+            <a:ext cx="10122964" cy="523220"/>
+          </a:xfrm>
+          <a:prstGeom prst="rect">
+            <a:avLst/>
+          </a:prstGeom>
+          <a:noFill/>
+        </p:spPr>
+        <p:txBody>
+          <a:bodyPr wrap="none" rtlCol="0">
+            <a:spAutoFit/>
+          </a:bodyPr>
+          <a:lstStyle/>
+          <a:p>
+            <a:r>
+              <a:rPr lang="en-GB" sz="2800" dirty="0"/>
+              <a:t>Measure the required position of the fiducial with the VTG Calibrator</a:t>
+            </a:r>
+            <a:endParaRPr lang="en-DK" sz="2800" dirty="0"/>
+          </a:p>
+        </p:txBody>
+      </p:sp>
+      <p:pic>
+        <p:nvPicPr>
+          <p:cNvPr id="5" name="Picture 4" descr="A person holding a rectangular device&#10;&#10;Description automatically generated">
+            <a:extLst>
+              <a:ext uri="{FF2B5EF4-FFF2-40B4-BE49-F238E27FC236}">
+                <a16:creationId xmlns:a16="http://schemas.microsoft.com/office/drawing/2014/main" id="{41E8767E-4DF0-CA69-7BBD-8D9062152D51}"/>
+              </a:ext>
+            </a:extLst>
+          </p:cNvPr>
+          <p:cNvPicPr>
+            <a:picLocks noChangeAspect="1"/>
+          </p:cNvPicPr>
+          <p:nvPr/>
+        </p:nvPicPr>
+        <p:blipFill>
+          <a:blip r:embed="rId3">
+            <a:extLst>
+              <a:ext uri="{28A0092B-C50C-407E-A947-70E740481C1C}">
+                <a14:useLocalDpi xmlns:a14="http://schemas.microsoft.com/office/drawing/2010/main" val="0"/>
+              </a:ext>
+            </a:extLst>
+          </a:blip>
+          <a:srcRect l="24801" t="8809" r="5080" b="20833"/>
+          <a:stretch/>
+        </p:blipFill>
+        <p:spPr>
+          <a:xfrm>
+            <a:off x="5589249" y="1265466"/>
+            <a:ext cx="5399880" cy="5418216"/>
+          </a:xfrm>
+          <a:prstGeom prst="rect">
+            <a:avLst/>
+          </a:prstGeom>
+        </p:spPr>
+      </p:pic>
+      <p:sp>
+        <p:nvSpPr>
+          <p:cNvPr id="10" name="TextBox 9">
+            <a:extLst>
+              <a:ext uri="{FF2B5EF4-FFF2-40B4-BE49-F238E27FC236}">
+                <a16:creationId xmlns:a16="http://schemas.microsoft.com/office/drawing/2014/main" id="{A785B3F8-15CB-39F1-62BC-2A6B96F4036D}"/>
+              </a:ext>
+            </a:extLst>
+          </p:cNvPr>
+          <p:cNvSpPr txBox="1"/>
+          <p:nvPr/>
+        </p:nvSpPr>
+        <p:spPr>
+          <a:xfrm>
+            <a:off x="1034518" y="1265466"/>
+            <a:ext cx="4353911" cy="3046988"/>
+          </a:xfrm>
+          <a:prstGeom prst="rect">
+            <a:avLst/>
+          </a:prstGeom>
+          <a:noFill/>
+        </p:spPr>
+        <p:txBody>
+          <a:bodyPr wrap="square" rtlCol="0">
+            <a:spAutoFit/>
+          </a:bodyPr>
+          <a:lstStyle/>
+          <a:p>
+            <a:r>
+              <a:rPr lang="en-GB" dirty="0"/>
+              <a:t>Procedure:</a:t>
+            </a:r>
+          </a:p>
+          <a:p>
+            <a:pPr marL="342900" indent="-342900">
+              <a:buAutoNum type="arabicPeriod"/>
+            </a:pPr>
+            <a:r>
+              <a:rPr lang="en-GB" dirty="0"/>
+              <a:t>Place the VTG Calibrator in the screen corner where the fiducials are to be generated.</a:t>
+            </a:r>
+          </a:p>
+          <a:p>
+            <a:pPr marL="342900" indent="-342900">
+              <a:buAutoNum type="arabicPeriod"/>
+            </a:pPr>
+            <a:r>
+              <a:rPr lang="en-GB" dirty="0"/>
+              <a:t>Read of the vertical and horizontal distances from the centre of the fiducial edge of display area.</a:t>
+            </a:r>
+          </a:p>
+          <a:p>
+            <a:pPr marL="342900" indent="-342900">
+              <a:buAutoNum type="arabicPeriod"/>
+            </a:pPr>
+            <a:endParaRPr lang="en-GB" dirty="0"/>
+          </a:p>
+          <a:p>
+            <a:r>
+              <a:rPr lang="en-GB" sz="1600" i="1" dirty="0"/>
+              <a:t>Please see the LabBench VTG manual if further information is required on the calibration procedure.</a:t>
+            </a:r>
+          </a:p>
+        </p:txBody>
+      </p:sp>
+    </p:spTree>
+    <p:extLst>
+      <p:ext uri="{BB962C8B-B14F-4D97-AF65-F5344CB8AC3E}">
+        <p14:creationId xmlns:p14="http://schemas.microsoft.com/office/powerpoint/2010/main" val="673147316"/>
+      </p:ext>
+    </p:extLst>
+  </p:cSld>
+  <p:clrMapOvr>
+    <a:masterClrMapping/>
+  </p:clrMapOvr>
+</p:sld>
+</file>
+
+<file path=ppt/slides/slide4.xml><?xml version="1.0" encoding="utf-8"?>
 <p:sld xmlns:a="http://schemas.openxmlformats.org/drawingml/2006/main" xmlns:r="http://schemas.openxmlformats.org/officeDocument/2006/relationships" xmlns:p="http://schemas.openxmlformats.org/presentationml/2006/main">
   <p:cSld>
     <p:spTree>
@@ -1383,6 +2733,36 @@
           <a:chExt cx="0" cy="0"/>
         </a:xfrm>
       </p:grpSpPr>
+    </p:spTree>
+    <p:extLst>
+      <p:ext uri="{BB962C8B-B14F-4D97-AF65-F5344CB8AC3E}">
+        <p14:creationId xmlns:p14="http://schemas.microsoft.com/office/powerpoint/2010/main" val="3645053151"/>
+      </p:ext>
+    </p:extLst>
+  </p:cSld>
+  <p:clrMapOvr>
+    <a:masterClrMapping/>
+  </p:clrMapOvr>
+</p:sld>
+</file>
+
+<file path=ppt/slides/slide5.xml><?xml version="1.0" encoding="utf-8"?>
+<p:sld xmlns:a="http://schemas.openxmlformats.org/drawingml/2006/main" xmlns:r="http://schemas.openxmlformats.org/officeDocument/2006/relationships" xmlns:p="http://schemas.openxmlformats.org/presentationml/2006/main">
+  <p:cSld>
+    <p:spTree>
+      <p:nvGrpSpPr>
+        <p:cNvPr id="1" name=""/>
+        <p:cNvGrpSpPr/>
+        <p:nvPr/>
+      </p:nvGrpSpPr>
+      <p:grpSpPr>
+        <a:xfrm>
+          <a:off x="0" y="0"/>
+          <a:ext cx="0" cy="0"/>
+          <a:chOff x="0" y="0"/>
+          <a:chExt cx="0" cy="0"/>
+        </a:xfrm>
+      </p:grpSpPr>
       <p:sp>
         <p:nvSpPr>
           <p:cNvPr id="2" name="TextBox 1">
@@ -1397,8 +2777,224 @@
         </p:nvSpPr>
         <p:spPr>
           <a:xfrm>
-            <a:off x="1758403" y="2988527"/>
-            <a:ext cx="8675195" cy="523220"/>
+            <a:off x="1675020" y="2951947"/>
+            <a:ext cx="8841961" cy="954107"/>
+          </a:xfrm>
+          <a:prstGeom prst="rect">
+            <a:avLst/>
+          </a:prstGeom>
+          <a:noFill/>
+        </p:spPr>
+        <p:txBody>
+          <a:bodyPr wrap="square" rtlCol="0">
+            <a:spAutoFit/>
+          </a:bodyPr>
+          <a:lstStyle/>
+          <a:p>
+            <a:pPr algn="just"/>
+            <a:r>
+              <a:rPr lang="en-GB" sz="2800" dirty="0"/>
+              <a:t>Start the test to generate a fiducial and use the VTG calibrator  to confirm the fiducial is in the correct position</a:t>
+            </a:r>
+            <a:endParaRPr lang="en-DK" sz="2800" dirty="0"/>
+          </a:p>
+        </p:txBody>
+      </p:sp>
+    </p:spTree>
+    <p:extLst>
+      <p:ext uri="{BB962C8B-B14F-4D97-AF65-F5344CB8AC3E}">
+        <p14:creationId xmlns:p14="http://schemas.microsoft.com/office/powerpoint/2010/main" val="2220615399"/>
+      </p:ext>
+    </p:extLst>
+  </p:cSld>
+  <p:clrMapOvr>
+    <a:masterClrMapping/>
+  </p:clrMapOvr>
+</p:sld>
+</file>
+
+<file path=ppt/slides/slide6.xml><?xml version="1.0" encoding="utf-8"?>
+<p:sld xmlns:a="http://schemas.openxmlformats.org/drawingml/2006/main" xmlns:r="http://schemas.openxmlformats.org/officeDocument/2006/relationships" xmlns:p="http://schemas.openxmlformats.org/presentationml/2006/main">
+  <p:cSld>
+    <p:spTree>
+      <p:nvGrpSpPr>
+        <p:cNvPr id="1" name=""/>
+        <p:cNvGrpSpPr/>
+        <p:nvPr/>
+      </p:nvGrpSpPr>
+      <p:grpSpPr>
+        <a:xfrm>
+          <a:off x="0" y="0"/>
+          <a:ext cx="0" cy="0"/>
+          <a:chOff x="0" y="0"/>
+          <a:chExt cx="0" cy="0"/>
+        </a:xfrm>
+      </p:grpSpPr>
+      <p:sp>
+        <p:nvSpPr>
+          <p:cNvPr id="2" name="TextBox 1">
+            <a:extLst>
+              <a:ext uri="{FF2B5EF4-FFF2-40B4-BE49-F238E27FC236}">
+                <a16:creationId xmlns:a16="http://schemas.microsoft.com/office/drawing/2014/main" id="{460438F3-F864-32F1-9E2B-21D621285109}"/>
+              </a:ext>
+            </a:extLst>
+          </p:cNvPr>
+          <p:cNvSpPr txBox="1"/>
+          <p:nvPr/>
+        </p:nvSpPr>
+        <p:spPr>
+          <a:xfrm>
+            <a:off x="937622" y="326972"/>
+            <a:ext cx="10316756" cy="1384995"/>
+          </a:xfrm>
+          <a:prstGeom prst="rect">
+            <a:avLst/>
+          </a:prstGeom>
+          <a:noFill/>
+        </p:spPr>
+        <p:txBody>
+          <a:bodyPr wrap="square" rtlCol="0">
+            <a:spAutoFit/>
+          </a:bodyPr>
+          <a:lstStyle/>
+          <a:p>
+            <a:r>
+              <a:rPr lang="en-GB" sz="2800" dirty="0"/>
+              <a:t>Mount the LabBench VTG device on the screen and start this test.</a:t>
+            </a:r>
+          </a:p>
+          <a:p>
+            <a:r>
+              <a:rPr lang="en-GB" sz="2800" dirty="0"/>
+              <a:t>This test will generate a series of visual stimuli with fiducials and will verify that triggers are correctly generated by the LabBench VTG.</a:t>
+            </a:r>
+            <a:endParaRPr lang="en-DK" sz="2800" dirty="0"/>
+          </a:p>
+        </p:txBody>
+      </p:sp>
+      <p:pic>
+        <p:nvPicPr>
+          <p:cNvPr id="4" name="Picture 3" descr="A hand holding a phone&#10;&#10;Description automatically generated">
+            <a:extLst>
+              <a:ext uri="{FF2B5EF4-FFF2-40B4-BE49-F238E27FC236}">
+                <a16:creationId xmlns:a16="http://schemas.microsoft.com/office/drawing/2014/main" id="{4BEB9670-88C6-1311-CAAF-3A6090AC5654}"/>
+              </a:ext>
+            </a:extLst>
+          </p:cNvPr>
+          <p:cNvPicPr>
+            <a:picLocks noChangeAspect="1"/>
+          </p:cNvPicPr>
+          <p:nvPr/>
+        </p:nvPicPr>
+        <p:blipFill>
+          <a:blip r:embed="rId3">
+            <a:extLst>
+              <a:ext uri="{28A0092B-C50C-407E-A947-70E740481C1C}">
+                <a14:useLocalDpi xmlns:a14="http://schemas.microsoft.com/office/drawing/2010/main" val="0"/>
+              </a:ext>
+            </a:extLst>
+          </a:blip>
+          <a:srcRect l="16468" t="25118" r="18652" b="15834"/>
+          <a:stretch/>
+        </p:blipFill>
+        <p:spPr>
+          <a:xfrm>
+            <a:off x="4275139" y="1975958"/>
+            <a:ext cx="3641722" cy="3314301"/>
+          </a:xfrm>
+          <a:prstGeom prst="rect">
+            <a:avLst/>
+          </a:prstGeom>
+        </p:spPr>
+      </p:pic>
+      <p:sp>
+        <p:nvSpPr>
+          <p:cNvPr id="5" name="TextBox 4">
+            <a:extLst>
+              <a:ext uri="{FF2B5EF4-FFF2-40B4-BE49-F238E27FC236}">
+                <a16:creationId xmlns:a16="http://schemas.microsoft.com/office/drawing/2014/main" id="{10847A60-7B7B-E65D-5F13-66F54C3D9CA8}"/>
+              </a:ext>
+            </a:extLst>
+          </p:cNvPr>
+          <p:cNvSpPr txBox="1"/>
+          <p:nvPr/>
+        </p:nvSpPr>
+        <p:spPr>
+          <a:xfrm>
+            <a:off x="937622" y="5467748"/>
+            <a:ext cx="10316756" cy="954107"/>
+          </a:xfrm>
+          <a:prstGeom prst="rect">
+            <a:avLst/>
+          </a:prstGeom>
+          <a:noFill/>
+        </p:spPr>
+        <p:txBody>
+          <a:bodyPr wrap="square" rtlCol="0">
+            <a:spAutoFit/>
+          </a:bodyPr>
+          <a:lstStyle/>
+          <a:p>
+            <a:r>
+              <a:rPr lang="en-GB" sz="2800" dirty="0"/>
+              <a:t>Each stimuli will consist of displaying a number. Each time you see a number press any button on the LabBench PAD.</a:t>
+            </a:r>
+            <a:endParaRPr lang="en-DK" sz="2800" dirty="0"/>
+          </a:p>
+        </p:txBody>
+      </p:sp>
+    </p:spTree>
+    <p:extLst>
+      <p:ext uri="{BB962C8B-B14F-4D97-AF65-F5344CB8AC3E}">
+        <p14:creationId xmlns:p14="http://schemas.microsoft.com/office/powerpoint/2010/main" val="3891210809"/>
+      </p:ext>
+    </p:extLst>
+  </p:cSld>
+  <p:clrMapOvr>
+    <a:masterClrMapping/>
+  </p:clrMapOvr>
+</p:sld>
+</file>
+
+<file path=ppt/slides/slide7.xml><?xml version="1.0" encoding="utf-8"?>
+<p:sld xmlns:a="http://schemas.openxmlformats.org/drawingml/2006/main" xmlns:r="http://schemas.openxmlformats.org/officeDocument/2006/relationships" xmlns:p="http://schemas.openxmlformats.org/presentationml/2006/main">
+  <p:cSld>
+    <p:spTree>
+      <p:nvGrpSpPr>
+        <p:cNvPr id="1" name="">
+          <a:extLst>
+            <a:ext uri="{FF2B5EF4-FFF2-40B4-BE49-F238E27FC236}">
+              <a16:creationId xmlns:a16="http://schemas.microsoft.com/office/drawing/2014/main" id="{DD921B93-8A05-A53A-0D50-ACF0C13377D6}"/>
+            </a:ext>
+          </a:extLst>
+        </p:cNvPr>
+        <p:cNvGrpSpPr/>
+        <p:nvPr/>
+      </p:nvGrpSpPr>
+      <p:grpSpPr>
+        <a:xfrm>
+          <a:off x="0" y="0"/>
+          <a:ext cx="0" cy="0"/>
+          <a:chOff x="0" y="0"/>
+          <a:chExt cx="0" cy="0"/>
+        </a:xfrm>
+      </p:grpSpPr>
+      <p:sp>
+        <p:nvSpPr>
+          <p:cNvPr id="3" name="TextBox 2">
+            <a:extLst>
+              <a:ext uri="{FF2B5EF4-FFF2-40B4-BE49-F238E27FC236}">
+                <a16:creationId xmlns:a16="http://schemas.microsoft.com/office/drawing/2014/main" id="{2E7EE8E5-803B-D3E9-0CBE-A1E7F68E51DB}"/>
+              </a:ext>
+            </a:extLst>
+          </p:cNvPr>
+          <p:cNvSpPr txBox="1"/>
+          <p:nvPr/>
+        </p:nvSpPr>
+        <p:spPr>
+          <a:xfrm>
+            <a:off x="5464257" y="2105561"/>
+            <a:ext cx="1263487" cy="2646878"/>
           </a:xfrm>
           <a:prstGeom prst="rect">
             <a:avLst/>
@@ -1412,17 +3008,161 @@
           <a:lstStyle/>
           <a:p>
             <a:r>
-              <a:rPr lang="en-GB" sz="2800" dirty="0"/>
-              <a:t>Use the VTG calibrator to check the position of the fiducial</a:t>
+              <a:rPr lang="en-GB" sz="16600" dirty="0"/>
+              <a:t>1</a:t>
             </a:r>
-            <a:endParaRPr lang="en-DK" sz="2800" dirty="0"/>
+            <a:endParaRPr lang="en-DK" sz="16600" dirty="0"/>
           </a:p>
         </p:txBody>
       </p:sp>
     </p:spTree>
     <p:extLst>
       <p:ext uri="{BB962C8B-B14F-4D97-AF65-F5344CB8AC3E}">
-        <p14:creationId xmlns:p14="http://schemas.microsoft.com/office/powerpoint/2010/main" val="3891210809"/>
+        <p14:creationId xmlns:p14="http://schemas.microsoft.com/office/powerpoint/2010/main" val="2285335906"/>
+      </p:ext>
+    </p:extLst>
+  </p:cSld>
+  <p:clrMapOvr>
+    <a:masterClrMapping/>
+  </p:clrMapOvr>
+</p:sld>
+</file>
+
+<file path=ppt/slides/slide8.xml><?xml version="1.0" encoding="utf-8"?>
+<p:sld xmlns:a="http://schemas.openxmlformats.org/drawingml/2006/main" xmlns:r="http://schemas.openxmlformats.org/officeDocument/2006/relationships" xmlns:p="http://schemas.openxmlformats.org/presentationml/2006/main">
+  <p:cSld>
+    <p:spTree>
+      <p:nvGrpSpPr>
+        <p:cNvPr id="1" name="">
+          <a:extLst>
+            <a:ext uri="{FF2B5EF4-FFF2-40B4-BE49-F238E27FC236}">
+              <a16:creationId xmlns:a16="http://schemas.microsoft.com/office/drawing/2014/main" id="{560888D9-3C69-E2D8-26AE-3FC4A6842648}"/>
+            </a:ext>
+          </a:extLst>
+        </p:cNvPr>
+        <p:cNvGrpSpPr/>
+        <p:nvPr/>
+      </p:nvGrpSpPr>
+      <p:grpSpPr>
+        <a:xfrm>
+          <a:off x="0" y="0"/>
+          <a:ext cx="0" cy="0"/>
+          <a:chOff x="0" y="0"/>
+          <a:chExt cx="0" cy="0"/>
+        </a:xfrm>
+      </p:grpSpPr>
+      <p:sp>
+        <p:nvSpPr>
+          <p:cNvPr id="3" name="TextBox 2">
+            <a:extLst>
+              <a:ext uri="{FF2B5EF4-FFF2-40B4-BE49-F238E27FC236}">
+                <a16:creationId xmlns:a16="http://schemas.microsoft.com/office/drawing/2014/main" id="{AE9A74B6-7990-FCFF-BDA3-F7FDDFC4EEE0}"/>
+              </a:ext>
+            </a:extLst>
+          </p:cNvPr>
+          <p:cNvSpPr txBox="1"/>
+          <p:nvPr/>
+        </p:nvSpPr>
+        <p:spPr>
+          <a:xfrm>
+            <a:off x="5464257" y="2105561"/>
+            <a:ext cx="1263487" cy="2646878"/>
+          </a:xfrm>
+          <a:prstGeom prst="rect">
+            <a:avLst/>
+          </a:prstGeom>
+          <a:noFill/>
+        </p:spPr>
+        <p:txBody>
+          <a:bodyPr wrap="none" rtlCol="0">
+            <a:spAutoFit/>
+          </a:bodyPr>
+          <a:lstStyle/>
+          <a:p>
+            <a:r>
+              <a:rPr lang="en-GB" sz="16600" dirty="0"/>
+              <a:t>2</a:t>
+            </a:r>
+            <a:endParaRPr lang="en-DK" sz="16600" dirty="0"/>
+          </a:p>
+        </p:txBody>
+      </p:sp>
+    </p:spTree>
+    <p:extLst>
+      <p:ext uri="{BB962C8B-B14F-4D97-AF65-F5344CB8AC3E}">
+        <p14:creationId xmlns:p14="http://schemas.microsoft.com/office/powerpoint/2010/main" val="4224736611"/>
+      </p:ext>
+    </p:extLst>
+  </p:cSld>
+  <p:clrMapOvr>
+    <a:masterClrMapping/>
+  </p:clrMapOvr>
+</p:sld>
+</file>
+
+<file path=ppt/slides/slide9.xml><?xml version="1.0" encoding="utf-8"?>
+<p:sld xmlns:a="http://schemas.openxmlformats.org/drawingml/2006/main" xmlns:r="http://schemas.openxmlformats.org/officeDocument/2006/relationships" xmlns:p="http://schemas.openxmlformats.org/presentationml/2006/main">
+  <p:cSld>
+    <p:spTree>
+      <p:nvGrpSpPr>
+        <p:cNvPr id="1" name="">
+          <a:extLst>
+            <a:ext uri="{FF2B5EF4-FFF2-40B4-BE49-F238E27FC236}">
+              <a16:creationId xmlns:a16="http://schemas.microsoft.com/office/drawing/2014/main" id="{37058C57-F70E-696F-6123-347ACD0F2780}"/>
+            </a:ext>
+          </a:extLst>
+        </p:cNvPr>
+        <p:cNvGrpSpPr/>
+        <p:nvPr/>
+      </p:nvGrpSpPr>
+      <p:grpSpPr>
+        <a:xfrm>
+          <a:off x="0" y="0"/>
+          <a:ext cx="0" cy="0"/>
+          <a:chOff x="0" y="0"/>
+          <a:chExt cx="0" cy="0"/>
+        </a:xfrm>
+      </p:grpSpPr>
+      <p:sp>
+        <p:nvSpPr>
+          <p:cNvPr id="3" name="TextBox 2">
+            <a:extLst>
+              <a:ext uri="{FF2B5EF4-FFF2-40B4-BE49-F238E27FC236}">
+                <a16:creationId xmlns:a16="http://schemas.microsoft.com/office/drawing/2014/main" id="{2549421E-D2CC-1E64-5B86-2D15C9EF7737}"/>
+              </a:ext>
+            </a:extLst>
+          </p:cNvPr>
+          <p:cNvSpPr txBox="1"/>
+          <p:nvPr/>
+        </p:nvSpPr>
+        <p:spPr>
+          <a:xfrm>
+            <a:off x="5464257" y="2105561"/>
+            <a:ext cx="1263487" cy="2646878"/>
+          </a:xfrm>
+          <a:prstGeom prst="rect">
+            <a:avLst/>
+          </a:prstGeom>
+          <a:noFill/>
+        </p:spPr>
+        <p:txBody>
+          <a:bodyPr wrap="none" rtlCol="0">
+            <a:spAutoFit/>
+          </a:bodyPr>
+          <a:lstStyle/>
+          <a:p>
+            <a:r>
+              <a:rPr lang="en-GB" sz="16600" dirty="0"/>
+              <a:t>3</a:t>
+            </a:r>
+            <a:endParaRPr lang="en-DK" sz="16600" dirty="0"/>
+          </a:p>
+        </p:txBody>
+      </p:sp>
+    </p:spTree>
+    <p:extLst>
+      <p:ext uri="{BB962C8B-B14F-4D97-AF65-F5344CB8AC3E}">
+        <p14:creationId xmlns:p14="http://schemas.microsoft.com/office/powerpoint/2010/main" val="3535884384"/>
       </p:ext>
     </p:extLst>
   </p:cSld>
@@ -2023,6 +3763,15 @@
 </file>
 
 <file path=customXml/item1.xml><?xml version="1.0" encoding="utf-8"?>
+<?mso-contentType ?>
+<FormTemplates xmlns="http://schemas.microsoft.com/sharepoint/v3/contenttype/forms">
+  <Display>DocumentLibraryForm</Display>
+  <Edit>DocumentLibraryForm</Edit>
+  <New>DocumentLibraryForm</New>
+</FormTemplates>
+</file>
+
+<file path=customXml/item2.xml><?xml version="1.0" encoding="utf-8"?>
 <ct:contentTypeSchema xmlns:ct="http://schemas.microsoft.com/office/2006/metadata/contentType" xmlns:ma="http://schemas.microsoft.com/office/2006/metadata/properties/metaAttributes" ct:_="" ma:_="" ma:contentTypeName="Document" ma:contentTypeID="0x0101005B996248A2D0E04D87B9DBB54D269DA4" ma:contentTypeVersion="17" ma:contentTypeDescription="Create a new document." ma:contentTypeScope="" ma:versionID="ccde82052730f3953ccb22e595f11d68">
   <xsd:schema xmlns:xsd="http://www.w3.org/2001/XMLSchema" xmlns:xs="http://www.w3.org/2001/XMLSchema" xmlns:p="http://schemas.microsoft.com/office/2006/metadata/properties" xmlns:ns2="51c7d8ad-74c8-4833-8478-0d0a5cafce0c" xmlns:ns3="6dfb7b4b-871d-4c24-9d42-16b14ecd044c" targetNamespace="http://schemas.microsoft.com/office/2006/metadata/properties" ma:root="true" ma:fieldsID="cdfcea1928cd178ac0427a8aa8ed82fa" ns2:_="" ns3:_="">
     <xsd:import namespace="51c7d8ad-74c8-4833-8478-0d0a5cafce0c"/>
@@ -2271,16 +4020,15 @@
 </ct:contentTypeSchema>
 </file>
 
-<file path=customXml/item2.xml><?xml version="1.0" encoding="utf-8"?>
-<?mso-contentType ?>
-<FormTemplates xmlns="http://schemas.microsoft.com/sharepoint/v3/contenttype/forms">
-  <Display>DocumentLibraryForm</Display>
-  <Edit>DocumentLibraryForm</Edit>
-  <New>DocumentLibraryForm</New>
-</FormTemplates>
+<file path=customXml/itemProps1.xml><?xml version="1.0" encoding="utf-8"?>
+<ds:datastoreItem xmlns:ds="http://schemas.openxmlformats.org/officeDocument/2006/customXml" ds:itemID="{14DB9512-0F98-4D44-8A6A-692E8659431F}">
+  <ds:schemaRefs>
+    <ds:schemaRef ds:uri="http://schemas.microsoft.com/sharepoint/v3/contenttype/forms"/>
+  </ds:schemaRefs>
+</ds:datastoreItem>
 </file>
 
-<file path=customXml/itemProps1.xml><?xml version="1.0" encoding="utf-8"?>
+<file path=customXml/itemProps2.xml><?xml version="1.0" encoding="utf-8"?>
 <ds:datastoreItem xmlns:ds="http://schemas.openxmlformats.org/officeDocument/2006/customXml" ds:itemID="{AA3D6522-B54A-4BC4-8FAA-0B5F1B46AFF9}">
   <ds:schemaRefs>
     <ds:schemaRef ds:uri="http://schemas.microsoft.com/office/2006/metadata/contentType"/>
@@ -2297,12 +4045,4 @@
     <ds:schemaRef ds:uri="http://schemas.microsoft.com/internal/obd"/>
   </ds:schemaRefs>
 </ds:datastoreItem>
-</file>
-
-<file path=customXml/itemProps2.xml><?xml version="1.0" encoding="utf-8"?>
-<ds:datastoreItem xmlns:ds="http://schemas.openxmlformats.org/officeDocument/2006/customXml" ds:itemID="{14DB9512-0F98-4D44-8A6A-692E8659431F}">
-  <ds:schemaRefs>
-    <ds:schemaRef ds:uri="http://schemas.microsoft.com/sharepoint/v3/contenttype/forms"/>
-  </ds:schemaRefs>
-</ds:datastoreItem>
 </file>
</xml_diff>

<commit_message>
Added the required tests + export of calibration record
</commit_message>
<xml_diff>
--- a/scCalibration/Images.pptx
+++ b/scCalibration/Images.pptx
@@ -3951,7 +3951,7 @@
             </a:r>
             <a:r>
               <a:rPr lang="en-GB" b="1" dirty="0"/>
-              <a:t>When you close LabBench Designer the calibration values will be written to the PDF file defines by the Post Session Action named Create Calibration Record. </a:t>
+              <a:t>When you close LabBench Designer the calibration values will be written to the PDF file by the Post Session Action named Create Calibration Record. </a:t>
             </a:r>
             <a:r>
               <a:rPr lang="en-GB" dirty="0"/>
@@ -4991,6 +4991,15 @@
 </file>
 
 <file path=customXml/item1.xml><?xml version="1.0" encoding="utf-8"?>
+<?mso-contentType ?>
+<FormTemplates xmlns="http://schemas.microsoft.com/sharepoint/v3/contenttype/forms">
+  <Display>DocumentLibraryForm</Display>
+  <Edit>DocumentLibraryForm</Edit>
+  <New>DocumentLibraryForm</New>
+</FormTemplates>
+</file>
+
+<file path=customXml/item2.xml><?xml version="1.0" encoding="utf-8"?>
 <ct:contentTypeSchema xmlns:ct="http://schemas.microsoft.com/office/2006/metadata/contentType" xmlns:ma="http://schemas.microsoft.com/office/2006/metadata/properties/metaAttributes" ct:_="" ma:_="" ma:contentTypeName="Document" ma:contentTypeID="0x0101005B996248A2D0E04D87B9DBB54D269DA4" ma:contentTypeVersion="17" ma:contentTypeDescription="Create a new document." ma:contentTypeScope="" ma:versionID="ccde82052730f3953ccb22e595f11d68">
   <xsd:schema xmlns:xsd="http://www.w3.org/2001/XMLSchema" xmlns:xs="http://www.w3.org/2001/XMLSchema" xmlns:p="http://schemas.microsoft.com/office/2006/metadata/properties" xmlns:ns2="51c7d8ad-74c8-4833-8478-0d0a5cafce0c" xmlns:ns3="6dfb7b4b-871d-4c24-9d42-16b14ecd044c" targetNamespace="http://schemas.microsoft.com/office/2006/metadata/properties" ma:root="true" ma:fieldsID="cdfcea1928cd178ac0427a8aa8ed82fa" ns2:_="" ns3:_="">
     <xsd:import namespace="51c7d8ad-74c8-4833-8478-0d0a5cafce0c"/>
@@ -5239,16 +5248,15 @@
 </ct:contentTypeSchema>
 </file>
 
-<file path=customXml/item2.xml><?xml version="1.0" encoding="utf-8"?>
-<?mso-contentType ?>
-<FormTemplates xmlns="http://schemas.microsoft.com/sharepoint/v3/contenttype/forms">
-  <Display>DocumentLibraryForm</Display>
-  <Edit>DocumentLibraryForm</Edit>
-  <New>DocumentLibraryForm</New>
-</FormTemplates>
+<file path=customXml/itemProps1.xml><?xml version="1.0" encoding="utf-8"?>
+<ds:datastoreItem xmlns:ds="http://schemas.openxmlformats.org/officeDocument/2006/customXml" ds:itemID="{14DB9512-0F98-4D44-8A6A-692E8659431F}">
+  <ds:schemaRefs>
+    <ds:schemaRef ds:uri="http://schemas.microsoft.com/sharepoint/v3/contenttype/forms"/>
+  </ds:schemaRefs>
+</ds:datastoreItem>
 </file>
 
-<file path=customXml/itemProps1.xml><?xml version="1.0" encoding="utf-8"?>
+<file path=customXml/itemProps2.xml><?xml version="1.0" encoding="utf-8"?>
 <ds:datastoreItem xmlns:ds="http://schemas.openxmlformats.org/officeDocument/2006/customXml" ds:itemID="{AA3D6522-B54A-4BC4-8FAA-0B5F1B46AFF9}">
   <ds:schemaRefs>
     <ds:schemaRef ds:uri="http://schemas.microsoft.com/office/2006/metadata/contentType"/>
@@ -5265,12 +5273,4 @@
     <ds:schemaRef ds:uri="http://schemas.microsoft.com/internal/obd"/>
   </ds:schemaRefs>
 </ds:datastoreItem>
-</file>
-
-<file path=customXml/itemProps2.xml><?xml version="1.0" encoding="utf-8"?>
-<ds:datastoreItem xmlns:ds="http://schemas.openxmlformats.org/officeDocument/2006/customXml" ds:itemID="{14DB9512-0F98-4D44-8A6A-692E8659431F}">
-  <ds:schemaRefs>
-    <ds:schemaRef ds:uri="http://schemas.microsoft.com/sharepoint/v3/contenttype/forms"/>
-  </ds:schemaRefs>
-</ds:datastoreItem>
 </file>
</xml_diff>